<commit_message>
2015-01-22 materials for lecture 4
</commit_message>
<xml_diff>
--- a/CSE10101/lecture/CSE10101.pptx
+++ b/CSE10101/lecture/CSE10101.pptx
@@ -53,6 +53,7 @@
     <p:sldId id="298" r:id="rId50"/>
     <p:sldId id="299" r:id="rId51"/>
     <p:sldId id="300" r:id="rId52"/>
+    <p:sldId id="301" r:id="rId53"/>
   </p:sldIdLst>
   <p:sldSz cx="9144000" cy="6858000"/>
   <p:notesSz cx="6858000" cy="9144000"/>
@@ -62,7 +63,7 @@
         <a:latin typeface="+mj-lt"/>
         <a:ea typeface="+mj-ea"/>
         <a:cs typeface="+mj-cs"/>
-        <a:sym typeface="Helvetica"/>
+        <a:sym typeface="Helvetica Neue"/>
       </a:defRPr>
     </a:lvl1pPr>
     <a:lvl2pPr>
@@ -70,7 +71,7 @@
         <a:latin typeface="+mj-lt"/>
         <a:ea typeface="+mj-ea"/>
         <a:cs typeface="+mj-cs"/>
-        <a:sym typeface="Helvetica"/>
+        <a:sym typeface="Helvetica Neue"/>
       </a:defRPr>
     </a:lvl2pPr>
     <a:lvl3pPr>
@@ -78,7 +79,7 @@
         <a:latin typeface="+mj-lt"/>
         <a:ea typeface="+mj-ea"/>
         <a:cs typeface="+mj-cs"/>
-        <a:sym typeface="Helvetica"/>
+        <a:sym typeface="Helvetica Neue"/>
       </a:defRPr>
     </a:lvl3pPr>
     <a:lvl4pPr>
@@ -86,7 +87,7 @@
         <a:latin typeface="+mj-lt"/>
         <a:ea typeface="+mj-ea"/>
         <a:cs typeface="+mj-cs"/>
-        <a:sym typeface="Helvetica"/>
+        <a:sym typeface="Helvetica Neue"/>
       </a:defRPr>
     </a:lvl4pPr>
     <a:lvl5pPr>
@@ -94,7 +95,7 @@
         <a:latin typeface="+mj-lt"/>
         <a:ea typeface="+mj-ea"/>
         <a:cs typeface="+mj-cs"/>
-        <a:sym typeface="Helvetica"/>
+        <a:sym typeface="Helvetica Neue"/>
       </a:defRPr>
     </a:lvl5pPr>
     <a:lvl6pPr>
@@ -102,7 +103,7 @@
         <a:latin typeface="+mj-lt"/>
         <a:ea typeface="+mj-ea"/>
         <a:cs typeface="+mj-cs"/>
-        <a:sym typeface="Helvetica"/>
+        <a:sym typeface="Helvetica Neue"/>
       </a:defRPr>
     </a:lvl6pPr>
     <a:lvl7pPr>
@@ -110,7 +111,7 @@
         <a:latin typeface="+mj-lt"/>
         <a:ea typeface="+mj-ea"/>
         <a:cs typeface="+mj-cs"/>
-        <a:sym typeface="Helvetica"/>
+        <a:sym typeface="Helvetica Neue"/>
       </a:defRPr>
     </a:lvl7pPr>
     <a:lvl8pPr>
@@ -118,7 +119,7 @@
         <a:latin typeface="+mj-lt"/>
         <a:ea typeface="+mj-ea"/>
         <a:cs typeface="+mj-cs"/>
-        <a:sym typeface="Helvetica"/>
+        <a:sym typeface="Helvetica Neue"/>
       </a:defRPr>
     </a:lvl8pPr>
     <a:lvl9pPr>
@@ -126,7 +127,7 @@
         <a:latin typeface="+mj-lt"/>
         <a:ea typeface="+mj-ea"/>
         <a:cs typeface="+mj-cs"/>
-        <a:sym typeface="Helvetica"/>
+        <a:sym typeface="Helvetica Neue"/>
       </a:defRPr>
     </a:lvl9pPr>
   </p:defaultTextStyle>
@@ -213,9 +214,9 @@
         <a:spcPct val="117999"/>
       </a:lnSpc>
       <a:defRPr sz="2200">
-        <a:latin typeface="+mn-lt"/>
-        <a:ea typeface="+mn-ea"/>
-        <a:cs typeface="+mn-cs"/>
+        <a:latin typeface="+mj-lt"/>
+        <a:ea typeface="+mj-ea"/>
+        <a:cs typeface="+mj-cs"/>
         <a:sym typeface="Helvetica Neue"/>
       </a:defRPr>
     </a:lvl1pPr>
@@ -224,9 +225,9 @@
         <a:spcPct val="117999"/>
       </a:lnSpc>
       <a:defRPr sz="2200">
-        <a:latin typeface="+mn-lt"/>
-        <a:ea typeface="+mn-ea"/>
-        <a:cs typeface="+mn-cs"/>
+        <a:latin typeface="+mj-lt"/>
+        <a:ea typeface="+mj-ea"/>
+        <a:cs typeface="+mj-cs"/>
         <a:sym typeface="Helvetica Neue"/>
       </a:defRPr>
     </a:lvl2pPr>
@@ -235,9 +236,9 @@
         <a:spcPct val="117999"/>
       </a:lnSpc>
       <a:defRPr sz="2200">
-        <a:latin typeface="+mn-lt"/>
-        <a:ea typeface="+mn-ea"/>
-        <a:cs typeface="+mn-cs"/>
+        <a:latin typeface="+mj-lt"/>
+        <a:ea typeface="+mj-ea"/>
+        <a:cs typeface="+mj-cs"/>
         <a:sym typeface="Helvetica Neue"/>
       </a:defRPr>
     </a:lvl3pPr>
@@ -246,9 +247,9 @@
         <a:spcPct val="117999"/>
       </a:lnSpc>
       <a:defRPr sz="2200">
-        <a:latin typeface="+mn-lt"/>
-        <a:ea typeface="+mn-ea"/>
-        <a:cs typeface="+mn-cs"/>
+        <a:latin typeface="+mj-lt"/>
+        <a:ea typeface="+mj-ea"/>
+        <a:cs typeface="+mj-cs"/>
         <a:sym typeface="Helvetica Neue"/>
       </a:defRPr>
     </a:lvl4pPr>
@@ -257,9 +258,9 @@
         <a:spcPct val="117999"/>
       </a:lnSpc>
       <a:defRPr sz="2200">
-        <a:latin typeface="+mn-lt"/>
-        <a:ea typeface="+mn-ea"/>
-        <a:cs typeface="+mn-cs"/>
+        <a:latin typeface="+mj-lt"/>
+        <a:ea typeface="+mj-ea"/>
+        <a:cs typeface="+mj-cs"/>
         <a:sym typeface="Helvetica Neue"/>
       </a:defRPr>
     </a:lvl5pPr>
@@ -268,9 +269,9 @@
         <a:spcPct val="117999"/>
       </a:lnSpc>
       <a:defRPr sz="2200">
-        <a:latin typeface="+mn-lt"/>
-        <a:ea typeface="+mn-ea"/>
-        <a:cs typeface="+mn-cs"/>
+        <a:latin typeface="+mj-lt"/>
+        <a:ea typeface="+mj-ea"/>
+        <a:cs typeface="+mj-cs"/>
         <a:sym typeface="Helvetica Neue"/>
       </a:defRPr>
     </a:lvl6pPr>
@@ -279,9 +280,9 @@
         <a:spcPct val="117999"/>
       </a:lnSpc>
       <a:defRPr sz="2200">
-        <a:latin typeface="+mn-lt"/>
-        <a:ea typeface="+mn-ea"/>
-        <a:cs typeface="+mn-cs"/>
+        <a:latin typeface="+mj-lt"/>
+        <a:ea typeface="+mj-ea"/>
+        <a:cs typeface="+mj-cs"/>
         <a:sym typeface="Helvetica Neue"/>
       </a:defRPr>
     </a:lvl7pPr>
@@ -290,9 +291,9 @@
         <a:spcPct val="117999"/>
       </a:lnSpc>
       <a:defRPr sz="2200">
-        <a:latin typeface="+mn-lt"/>
-        <a:ea typeface="+mn-ea"/>
-        <a:cs typeface="+mn-cs"/>
+        <a:latin typeface="+mj-lt"/>
+        <a:ea typeface="+mj-ea"/>
+        <a:cs typeface="+mj-cs"/>
         <a:sym typeface="Helvetica Neue"/>
       </a:defRPr>
     </a:lvl8pPr>
@@ -301,9 +302,9 @@
         <a:spcPct val="117999"/>
       </a:lnSpc>
       <a:defRPr sz="2200">
-        <a:latin typeface="+mn-lt"/>
-        <a:ea typeface="+mn-ea"/>
-        <a:cs typeface="+mn-cs"/>
+        <a:latin typeface="+mj-lt"/>
+        <a:ea typeface="+mj-ea"/>
+        <a:cs typeface="+mj-cs"/>
         <a:sym typeface="Helvetica Neue"/>
       </a:defRPr>
     </a:lvl9pPr>
@@ -666,8 +667,8 @@
         </p:nvSpPr>
         <p:spPr>
           <a:xfrm>
-            <a:off x="0" y="4752125"/>
-            <a:ext cx="9144002" cy="2112964"/>
+            <a:off x="-1" y="4752125"/>
+            <a:ext cx="9144004" cy="2112965"/>
           </a:xfrm>
           <a:custGeom>
             <a:avLst/>
@@ -753,8 +754,8 @@
         </p:nvSpPr>
         <p:spPr>
           <a:xfrm>
-            <a:off x="6105524" y="0"/>
-            <a:ext cx="3038477" cy="6858001"/>
+            <a:off x="6105523" y="0"/>
+            <a:ext cx="3038478" cy="6858001"/>
           </a:xfrm>
           <a:custGeom>
             <a:avLst/>
@@ -1261,7 +1262,7 @@
         <p:spPr>
           <a:xfrm>
             <a:off x="457200" y="274638"/>
-            <a:ext cx="6019800" cy="6583364"/>
+            <a:ext cx="6019800" cy="6583365"/>
           </a:xfrm>
           <a:prstGeom prst="rect">
             <a:avLst/>
@@ -1689,7 +1690,7 @@
         <p:spPr>
           <a:xfrm>
             <a:off x="6553200" y="6404292"/>
-            <a:ext cx="2133600" cy="269239"/>
+            <a:ext cx="2133600" cy="269237"/>
           </a:xfrm>
           <a:prstGeom prst="rect">
             <a:avLst/>
@@ -1974,8 +1975,8 @@
         </p:nvSpPr>
         <p:spPr>
           <a:xfrm>
-            <a:off x="0" y="4752125"/>
-            <a:ext cx="9144002" cy="2112964"/>
+            <a:off x="-1" y="4752125"/>
+            <a:ext cx="9144004" cy="2112965"/>
           </a:xfrm>
           <a:custGeom>
             <a:avLst/>
@@ -2061,8 +2062,8 @@
         </p:nvSpPr>
         <p:spPr>
           <a:xfrm>
-            <a:off x="6105524" y="0"/>
-            <a:ext cx="3038477" cy="6858001"/>
+            <a:off x="6105523" y="0"/>
+            <a:ext cx="3038478" cy="6858001"/>
           </a:xfrm>
           <a:custGeom>
             <a:avLst/>
@@ -2392,7 +2393,7 @@
               </a:spcBef>
               <a:defRPr sz="2600"/>
             </a:lvl4pPr>
-            <a:lvl5pPr marL="1571752" indent="-264159">
+            <a:lvl5pPr marL="1571752" indent="-264158">
               <a:spcBef>
                 <a:spcPts val="600"/>
               </a:spcBef>
@@ -2841,7 +2842,7 @@
         <p:spPr>
           <a:xfrm>
             <a:off x="457200" y="1185528"/>
-            <a:ext cx="3200400" cy="4159251"/>
+            <a:ext cx="3200400" cy="5672472"/>
           </a:xfrm>
           <a:prstGeom prst="rect">
             <a:avLst/>
@@ -2938,7 +2939,7 @@
         <p:spPr>
           <a:xfrm>
             <a:off x="8156447" y="6651642"/>
-            <a:ext cx="762002" cy="135547"/>
+            <a:ext cx="762003" cy="135546"/>
           </a:xfrm>
           <a:prstGeom prst="rect">
             <a:avLst/>
@@ -2990,7 +2991,7 @@
         <p:spPr>
           <a:xfrm>
             <a:off x="5556732" y="0"/>
-            <a:ext cx="3053870" cy="2959518"/>
+            <a:ext cx="3053871" cy="2959518"/>
           </a:xfrm>
           <a:prstGeom prst="rect">
             <a:avLst/>
@@ -3139,8 +3140,8 @@
         </p:nvSpPr>
         <p:spPr>
           <a:xfrm>
-            <a:off x="0" y="4752125"/>
-            <a:ext cx="9144002" cy="2112964"/>
+            <a:off x="-1" y="4752125"/>
+            <a:ext cx="9144004" cy="2112965"/>
           </a:xfrm>
           <a:custGeom>
             <a:avLst/>
@@ -3502,7 +3503,7 @@
         <p:spPr>
           <a:xfrm>
             <a:off x="8153400" y="6651642"/>
-            <a:ext cx="762000" cy="135547"/>
+            <a:ext cx="762000" cy="135546"/>
           </a:xfrm>
           <a:prstGeom prst="rect">
             <a:avLst/>
@@ -3968,8 +3969,8 @@
         </p:nvSpPr>
         <p:spPr>
           <a:xfrm>
-            <a:off x="429062" y="3337559"/>
-            <a:ext cx="6480052" cy="2301242"/>
+            <a:off x="429061" y="3337559"/>
+            <a:ext cx="6480054" cy="2301243"/>
           </a:xfrm>
           <a:prstGeom prst="rect">
             <a:avLst/>
@@ -4101,8 +4102,8 @@
         </p:nvSpPr>
         <p:spPr>
           <a:xfrm>
-            <a:off x="433048" y="1544812"/>
-            <a:ext cx="6480052" cy="1752601"/>
+            <a:off x="433047" y="1544812"/>
+            <a:ext cx="6480054" cy="1752601"/>
           </a:xfrm>
           <a:prstGeom prst="rect">
             <a:avLst/>
@@ -4167,7 +4168,7 @@
         <p:spPr>
           <a:xfrm>
             <a:off x="8153400" y="6651642"/>
-            <a:ext cx="762000" cy="135547"/>
+            <a:ext cx="762000" cy="135548"/>
           </a:xfrm>
           <a:prstGeom prst="rect">
             <a:avLst/>
@@ -4424,7 +4425,7 @@
         <p:spPr>
           <a:xfrm>
             <a:off x="8153400" y="6651642"/>
-            <a:ext cx="762000" cy="135547"/>
+            <a:ext cx="762000" cy="135548"/>
           </a:xfrm>
           <a:prstGeom prst="rect">
             <a:avLst/>
@@ -4520,6 +4521,10 @@
           </p:nvPr>
         </p:nvSpPr>
         <p:spPr>
+          <a:xfrm>
+            <a:off x="457200" y="92074"/>
+            <a:ext cx="7467600" cy="1508128"/>
+          </a:xfrm>
           <a:prstGeom prst="rect">
             <a:avLst/>
           </a:prstGeom>
@@ -4563,7 +4568,7 @@
           <a:bodyPr/>
           <a:lstStyle/>
           <a:p>
-            <a:pPr lvl="0" marL="676654" indent="-640078">
+            <a:pPr lvl="0" marL="1103372" indent="-1066796">
               <a:defRPr sz="1800">
                 <a:solidFill>
                   <a:srgbClr val="000000"/>
@@ -4585,7 +4590,7 @@
             </a:endParaRPr>
           </a:p>
           <a:p>
-            <a:pPr lvl="1" marL="1088134" indent="-640078">
+            <a:pPr lvl="1" marL="1514852" indent="-1066796">
               <a:buSzPct val="80000"/>
               <a:buChar char="⦿"/>
               <a:defRPr sz="1800">
@@ -4681,7 +4686,7 @@
             </a:endParaRPr>
           </a:p>
           <a:p>
-            <a:pPr lvl="1" marL="1088134" indent="-640078">
+            <a:pPr lvl="1" marL="1514852" indent="-1066796">
               <a:buSzPct val="80000"/>
               <a:buChar char="⦿"/>
               <a:defRPr sz="1800">
@@ -4752,7 +4757,7 @@
         <p:spPr>
           <a:xfrm>
             <a:off x="8153400" y="6651642"/>
-            <a:ext cx="762000" cy="135547"/>
+            <a:ext cx="762000" cy="135548"/>
           </a:xfrm>
           <a:prstGeom prst="rect">
             <a:avLst/>
@@ -4821,6 +4826,10 @@
           </p:nvPr>
         </p:nvSpPr>
         <p:spPr>
+          <a:xfrm>
+            <a:off x="457200" y="92074"/>
+            <a:ext cx="7467600" cy="1508128"/>
+          </a:xfrm>
           <a:prstGeom prst="rect">
             <a:avLst/>
           </a:prstGeom>
@@ -4864,7 +4873,7 @@
           <a:bodyPr/>
           <a:lstStyle/>
           <a:p>
-            <a:pPr lvl="0">
+            <a:pPr lvl="0" marL="676654" indent="-640078">
               <a:defRPr sz="1800">
                 <a:solidFill>
                   <a:srgbClr val="000000"/>
@@ -4872,15 +4881,7 @@
               </a:defRPr>
             </a:pPr>
             <a:r>
-              <a:rPr sz="3000" u="sng">
-                <a:solidFill>
-                  <a:srgbClr val="0000FF"/>
-                </a:solidFill>
-                <a:uFill>
-                  <a:solidFill>
-                    <a:srgbClr val="0000FF"/>
-                  </a:solidFill>
-                </a:uFill>
+              <a:rPr sz="3000">
                 <a:hlinkClick r:id="rId2" invalidUrl="" action="" tgtFrame="" tooltip="" history="1" highlightClick="0" endSnd="0"/>
               </a:rPr>
               <a:t>https://www.python.org/</a:t>
@@ -4900,7 +4901,7 @@
             </a:endParaRPr>
           </a:p>
           <a:p>
-            <a:pPr lvl="0">
+            <a:pPr lvl="0" marL="676654" indent="-640078">
               <a:defRPr sz="1800">
                 <a:solidFill>
                   <a:srgbClr val="000000"/>
@@ -4908,15 +4909,7 @@
               </a:defRPr>
             </a:pPr>
             <a:r>
-              <a:rPr sz="3000" u="sng">
-                <a:solidFill>
-                  <a:srgbClr val="0000FF"/>
-                </a:solidFill>
-                <a:uFill>
-                  <a:solidFill>
-                    <a:srgbClr val="0000FF"/>
-                  </a:solidFill>
-                </a:uFill>
+              <a:rPr sz="3000">
                 <a:hlinkClick r:id="rId3" invalidUrl="" action="" tgtFrame="" tooltip="" history="1" highlightClick="0" endSnd="0"/>
               </a:rPr>
               <a:t>https://docs.python.org/2/</a:t>
@@ -4941,6 +4934,10 @@
           </p:nvPr>
         </p:nvSpPr>
         <p:spPr>
+          <a:xfrm>
+            <a:off x="8153400" y="6651642"/>
+            <a:ext cx="762000" cy="135548"/>
+          </a:xfrm>
           <a:prstGeom prst="rect">
             <a:avLst/>
           </a:prstGeom>
@@ -4951,7 +4948,9 @@
           </a:extLst>
         </p:spPr>
         <p:txBody>
-          <a:bodyPr/>
+          <a:bodyPr>
+            <a:normAutofit fontScale="100000" lnSpcReduction="0"/>
+          </a:bodyPr>
           <a:lstStyle/>
           <a:p>
             <a:pPr lvl="0">
@@ -5006,6 +5005,10 @@
           </p:nvPr>
         </p:nvSpPr>
         <p:spPr>
+          <a:xfrm>
+            <a:off x="457200" y="92074"/>
+            <a:ext cx="7467600" cy="1508128"/>
+          </a:xfrm>
           <a:prstGeom prst="rect">
             <a:avLst/>
           </a:prstGeom>
@@ -5049,7 +5052,7 @@
           <a:bodyPr/>
           <a:lstStyle/>
           <a:p>
-            <a:pPr lvl="0" marL="551382" indent="-518464" defTabSz="822958">
+            <a:pPr lvl="0" marL="810614" indent="-777696" defTabSz="822958">
               <a:spcBef>
                 <a:spcPts val="600"/>
               </a:spcBef>
@@ -5070,7 +5073,7 @@
             <a:endParaRPr sz="2700"/>
           </a:p>
           <a:p>
-            <a:pPr lvl="1" marL="921714" indent="-518464" defTabSz="822958">
+            <a:pPr lvl="1" marL="1180946" indent="-777696" defTabSz="822958">
               <a:spcBef>
                 <a:spcPts val="600"/>
               </a:spcBef>
@@ -5093,7 +5096,7 @@
             <a:endParaRPr sz="2700"/>
           </a:p>
           <a:p>
-            <a:pPr lvl="1" marL="921714" indent="-518464" defTabSz="822958">
+            <a:pPr lvl="1" marL="1180946" indent="-777696" defTabSz="822958">
               <a:spcBef>
                 <a:spcPts val="600"/>
               </a:spcBef>
@@ -5116,7 +5119,7 @@
             <a:endParaRPr sz="2700"/>
           </a:p>
           <a:p>
-            <a:pPr lvl="1" marL="921714" indent="-518464" defTabSz="822958">
+            <a:pPr lvl="1" marL="1180946" indent="-777696" defTabSz="822958">
               <a:spcBef>
                 <a:spcPts val="600"/>
               </a:spcBef>
@@ -5139,7 +5142,7 @@
             <a:endParaRPr sz="2700"/>
           </a:p>
           <a:p>
-            <a:pPr lvl="1" marL="921714" indent="-518464" defTabSz="822958">
+            <a:pPr lvl="1" marL="1180946" indent="-777696" defTabSz="822958">
               <a:spcBef>
                 <a:spcPts val="600"/>
               </a:spcBef>
@@ -5162,7 +5165,7 @@
             <a:endParaRPr sz="2700"/>
           </a:p>
           <a:p>
-            <a:pPr lvl="1" marL="921714" indent="-518464" defTabSz="822958">
+            <a:pPr lvl="1" marL="1180946" indent="-777696" defTabSz="822958">
               <a:spcBef>
                 <a:spcPts val="600"/>
               </a:spcBef>
@@ -5185,7 +5188,7 @@
             <a:endParaRPr sz="2700"/>
           </a:p>
           <a:p>
-            <a:pPr lvl="1" marL="921714" indent="-518464" defTabSz="822958">
+            <a:pPr lvl="1" marL="1180946" indent="-777696" defTabSz="822958">
               <a:spcBef>
                 <a:spcPts val="600"/>
               </a:spcBef>
@@ -5208,7 +5211,7 @@
             <a:endParaRPr sz="2700"/>
           </a:p>
           <a:p>
-            <a:pPr lvl="1" marL="921714" indent="-518464" defTabSz="822958">
+            <a:pPr lvl="1" marL="1180946" indent="-777696" defTabSz="822958">
               <a:spcBef>
                 <a:spcPts val="600"/>
               </a:spcBef>
@@ -5231,7 +5234,7 @@
             <a:endParaRPr sz="2700"/>
           </a:p>
           <a:p>
-            <a:pPr lvl="1" marL="921714" indent="-518464" defTabSz="822958">
+            <a:pPr lvl="1" marL="1180946" indent="-777696" defTabSz="822958">
               <a:spcBef>
                 <a:spcPts val="600"/>
               </a:spcBef>
@@ -5254,7 +5257,7 @@
             <a:endParaRPr sz="2700"/>
           </a:p>
           <a:p>
-            <a:pPr lvl="0" marL="551382" indent="-518464" defTabSz="822958">
+            <a:pPr lvl="0" marL="810614" indent="-777696" defTabSz="822958">
               <a:spcBef>
                 <a:spcPts val="600"/>
               </a:spcBef>
@@ -5286,7 +5289,7 @@
         <p:spPr>
           <a:xfrm>
             <a:off x="8153400" y="6651642"/>
-            <a:ext cx="762000" cy="135547"/>
+            <a:ext cx="762000" cy="135548"/>
           </a:xfrm>
           <a:prstGeom prst="rect">
             <a:avLst/>
@@ -5410,7 +5413,7 @@
         <p:spPr>
           <a:xfrm>
             <a:off x="8153400" y="6651642"/>
-            <a:ext cx="762000" cy="135547"/>
+            <a:ext cx="762000" cy="135548"/>
           </a:xfrm>
           <a:prstGeom prst="rect">
             <a:avLst/>
@@ -5723,60 +5726,31 @@
         </p:nvSpPr>
         <p:spPr>
           <a:xfrm>
-            <a:off x="685800" y="3583837"/>
-            <a:ext cx="6629400" cy="1826364"/>
+            <a:off x="457200" y="92074"/>
+            <a:ext cx="7467600" cy="1508128"/>
           </a:xfrm>
           <a:prstGeom prst="rect">
             <a:avLst/>
           </a:prstGeom>
         </p:spPr>
         <p:txBody>
-          <a:bodyPr/>
-          <a:lstStyle>
-            <a:lvl1pPr defTabSz="859536">
-              <a:defRPr sz="3400">
-                <a:ln w="4417"/>
-                <a:effectLst>
-                  <a:outerShdw sx="100000" sy="100000" kx="0" ky="0" algn="b" rotWithShape="0" blurRad="50800" dist="35814" dir="5400000">
-                    <a:srgbClr val="000000">
-                      <a:alpha val="50000"/>
-                    </a:srgbClr>
-                  </a:outerShdw>
-                </a:effectLst>
-              </a:defRPr>
-            </a:lvl1pPr>
-          </a:lstStyle>
+          <a:bodyPr lIns="0" tIns="0" rIns="0" bIns="0"/>
+          <a:lstStyle/>
           <a:p>
             <a:pPr lvl="0">
-              <a:defRPr b="0" sz="1800">
-                <a:ln w="9525">
-                  <a:noFill/>
-                </a:ln>
-                <a:solidFill>
-                  <a:srgbClr val="000000"/>
-                </a:solidFill>
-                <a:effectLst/>
-              </a:defRPr>
-            </a:pPr>
-            <a:r>
-              <a:rPr b="1" sz="3400">
-                <a:ln w="4417">
-                  <a:solidFill>
-                    <a:srgbClr val="5CD4FF"/>
-                  </a:solidFill>
-                </a:ln>
-                <a:solidFill>
-                  <a:srgbClr val="9FD4E8"/>
-                </a:solidFill>
-                <a:effectLst>
-                  <a:outerShdw sx="100000" sy="100000" kx="0" ky="0" algn="b" rotWithShape="0" blurRad="50800" dist="35814" dir="5400000">
-                    <a:srgbClr val="000000">
-                      <a:alpha val="50000"/>
-                    </a:srgbClr>
-                  </a:outerShdw>
-                </a:effectLst>
-              </a:rPr>
-              <a:t>1/27: St. Angela Merici, founder of Company of St. Ursula (first women’s teaching order)</a:t>
+              <a:defRPr sz="1800">
+                <a:solidFill>
+                  <a:srgbClr val="000000"/>
+                </a:solidFill>
+              </a:defRPr>
+            </a:pPr>
+            <a:r>
+              <a:rPr sz="4600">
+                <a:solidFill>
+                  <a:srgbClr val="FFFFFF"/>
+                </a:solidFill>
+              </a:rPr>
+              <a:t>Today’s Agenda</a:t>
             </a:r>
           </a:p>
         </p:txBody>
@@ -5790,19 +5764,152 @@
           </p:nvPr>
         </p:nvSpPr>
         <p:spPr>
+          <a:prstGeom prst="rect">
+            <a:avLst/>
+          </a:prstGeom>
+        </p:spPr>
+        <p:txBody>
+          <a:bodyPr lIns="0" tIns="0" rIns="0" bIns="0"/>
+          <a:lstStyle/>
+          <a:p>
+            <a:pPr lvl="0" marL="810614" indent="-777696" defTabSz="822958">
+              <a:spcBef>
+                <a:spcPts val="600"/>
+              </a:spcBef>
+              <a:defRPr sz="1800">
+                <a:solidFill>
+                  <a:srgbClr val="000000"/>
+                </a:solidFill>
+              </a:defRPr>
+            </a:pPr>
+            <a:r>
+              <a:rPr sz="2700">
+                <a:solidFill>
+                  <a:srgbClr val="FFFFFF"/>
+                </a:solidFill>
+              </a:rPr>
+              <a:t>Resolve any remaining systems issues</a:t>
+            </a:r>
+            <a:endParaRPr sz="2700">
+              <a:solidFill>
+                <a:srgbClr val="FFFFFF"/>
+              </a:solidFill>
+            </a:endParaRPr>
+          </a:p>
+          <a:p>
+            <a:pPr lvl="0" marL="810614" indent="-777696" defTabSz="822958">
+              <a:spcBef>
+                <a:spcPts val="600"/>
+              </a:spcBef>
+              <a:defRPr sz="1800">
+                <a:solidFill>
+                  <a:srgbClr val="000000"/>
+                </a:solidFill>
+              </a:defRPr>
+            </a:pPr>
+            <a:r>
+              <a:rPr sz="2700">
+                <a:solidFill>
+                  <a:srgbClr val="FFFFFF"/>
+                </a:solidFill>
+              </a:rPr>
+              <a:t>Chapter 3: Conditional execution</a:t>
+            </a:r>
+            <a:endParaRPr sz="2700">
+              <a:solidFill>
+                <a:srgbClr val="FFFFFF"/>
+              </a:solidFill>
+            </a:endParaRPr>
+          </a:p>
+          <a:p>
+            <a:pPr lvl="0" marL="810614" indent="-777696" defTabSz="822958">
+              <a:spcBef>
+                <a:spcPts val="600"/>
+              </a:spcBef>
+              <a:defRPr sz="1800">
+                <a:solidFill>
+                  <a:srgbClr val="000000"/>
+                </a:solidFill>
+              </a:defRPr>
+            </a:pPr>
+            <a:r>
+              <a:rPr sz="2700">
+                <a:solidFill>
+                  <a:srgbClr val="FFFFFF"/>
+                </a:solidFill>
+              </a:rPr>
+              <a:t>More on iteration (loops)</a:t>
+            </a:r>
+            <a:endParaRPr sz="2700">
+              <a:solidFill>
+                <a:srgbClr val="FFFFFF"/>
+              </a:solidFill>
+            </a:endParaRPr>
+          </a:p>
+          <a:p>
+            <a:pPr lvl="0" marL="810614" indent="-777696" defTabSz="822958">
+              <a:spcBef>
+                <a:spcPts val="600"/>
+              </a:spcBef>
+              <a:defRPr sz="1800">
+                <a:solidFill>
+                  <a:srgbClr val="000000"/>
+                </a:solidFill>
+              </a:defRPr>
+            </a:pPr>
+            <a:r>
+              <a:rPr sz="2700">
+                <a:solidFill>
+                  <a:srgbClr val="FFFFFF"/>
+                </a:solidFill>
+              </a:rPr>
+              <a:t>Lots of interactive exercises!</a:t>
+            </a:r>
+          </a:p>
+        </p:txBody>
+      </p:sp>
+      <p:sp>
+        <p:nvSpPr>
+          <p:cNvPr id="124" name="Shape 124"/>
+          <p:cNvSpPr/>
+          <p:nvPr>
+            <p:ph type="sldNum" sz="quarter" idx="2"/>
+          </p:nvPr>
+        </p:nvSpPr>
+        <p:spPr>
           <a:xfrm>
-            <a:off x="685800" y="2485800"/>
-            <a:ext cx="6629400" cy="1066689"/>
+            <a:off x="8153400" y="6516095"/>
+            <a:ext cx="762000" cy="135546"/>
           </a:xfrm>
           <a:prstGeom prst="rect">
             <a:avLst/>
           </a:prstGeom>
-        </p:spPr>
-        <p:txBody>
-          <a:bodyPr/>
+          <a:extLst>
+            <a:ext uri="{C572A759-6A51-4108-AA02-DFA0A04FC94B}">
+              <ma14:wrappingTextBoxFlag xmlns:ma14="http://schemas.microsoft.com/office/mac/drawingml/2011/main" val="1"/>
+            </a:ext>
+          </a:extLst>
+        </p:spPr>
+        <p:txBody>
+          <a:bodyPr>
+            <a:normAutofit fontScale="100000" lnSpcReduction="0"/>
+          </a:bodyPr>
           <a:lstStyle/>
           <a:p>
-            <a:pPr lvl="0"/>
+            <a:pPr lvl="0">
+              <a:defRPr sz="1800">
+                <a:solidFill>
+                  <a:srgbClr val="000000"/>
+                </a:solidFill>
+              </a:defRPr>
+            </a:pPr>
+            <a:fld id="{86CB4B4D-7CA3-9044-876B-883B54F8677D}" type="slidenum">
+              <a:rPr sz="1000">
+                <a:solidFill>
+                  <a:srgbClr val="9B9998"/>
+                </a:solidFill>
+              </a:rPr>
+            </a:fld>
           </a:p>
         </p:txBody>
       </p:sp>
@@ -5834,7 +5941,7 @@
       </p:grpSpPr>
       <p:sp>
         <p:nvSpPr>
-          <p:cNvPr id="125" name="Shape 125"/>
+          <p:cNvPr id="126" name="Shape 126"/>
           <p:cNvSpPr/>
           <p:nvPr>
             <p:ph type="title"/>
@@ -5851,7 +5958,20 @@
         </p:spPr>
         <p:txBody>
           <a:bodyPr/>
-          <a:lstStyle/>
+          <a:lstStyle>
+            <a:lvl1pPr defTabSz="859536">
+              <a:defRPr sz="3400">
+                <a:ln w="4417"/>
+                <a:effectLst>
+                  <a:outerShdw sx="100000" sy="100000" kx="0" ky="0" algn="b" rotWithShape="0" blurRad="50800" dist="35814" dir="5400000">
+                    <a:srgbClr val="000000">
+                      <a:alpha val="50000"/>
+                    </a:srgbClr>
+                  </a:outerShdw>
+                </a:effectLst>
+              </a:defRPr>
+            </a:lvl1pPr>
+          </a:lstStyle>
           <a:p>
             <a:pPr lvl="0">
               <a:defRPr b="0" sz="1800">
@@ -5865,8 +5985,8 @@
               </a:defRPr>
             </a:pPr>
             <a:r>
-              <a:rPr b="1" sz="4200">
-                <a:ln w="5000">
+              <a:rPr b="1" sz="3400">
+                <a:ln w="4417">
                   <a:solidFill>
                     <a:srgbClr val="5CD4FF"/>
                   </a:solidFill>
@@ -5875,60 +5995,21 @@
                   <a:srgbClr val="9FD4E8"/>
                 </a:solidFill>
                 <a:effectLst>
-                  <a:outerShdw sx="100000" sy="100000" kx="0" ky="0" algn="b" rotWithShape="0" blurRad="50800" dist="38100" dir="5400000">
+                  <a:outerShdw sx="100000" sy="100000" kx="0" ky="0" algn="b" rotWithShape="0" blurRad="50800" dist="35814" dir="5400000">
                     <a:srgbClr val="000000">
                       <a:alpha val="50000"/>
                     </a:srgbClr>
                   </a:outerShdw>
                 </a:effectLst>
               </a:rPr>
-              <a:t>1/29: (no feast)</a:t>
-            </a:r>
-            <a:br>
-              <a:rPr b="1" sz="4200">
-                <a:ln w="5000">
-                  <a:solidFill>
-                    <a:srgbClr val="5CD4FF"/>
-                  </a:solidFill>
-                </a:ln>
-                <a:solidFill>
-                  <a:srgbClr val="9FD4E8"/>
-                </a:solidFill>
-                <a:effectLst>
-                  <a:outerShdw sx="100000" sy="100000" kx="0" ky="0" algn="b" rotWithShape="0" blurRad="50800" dist="38100" dir="5400000">
-                    <a:srgbClr val="000000">
-                      <a:alpha val="50000"/>
-                    </a:srgbClr>
-                  </a:outerShdw>
-                </a:effectLst>
-              </a:rPr>
-            </a:br>
-            <a:r>
-              <a:rPr b="1" sz="4200">
-                <a:ln w="5000">
-                  <a:solidFill>
-                    <a:srgbClr val="5CD4FF"/>
-                  </a:solidFill>
-                </a:ln>
-                <a:solidFill>
-                  <a:srgbClr val="9FD4E8"/>
-                </a:solidFill>
-                <a:effectLst>
-                  <a:outerShdw sx="100000" sy="100000" kx="0" ky="0" algn="b" rotWithShape="0" blurRad="50800" dist="38100" dir="5400000">
-                    <a:srgbClr val="000000">
-                      <a:alpha val="50000"/>
-                    </a:srgbClr>
-                  </a:outerShdw>
-                </a:effectLst>
-              </a:rPr>
-              <a:t>SG, Bro. Juniper</a:t>
-            </a:r>
-          </a:p>
-        </p:txBody>
-      </p:sp>
-      <p:sp>
-        <p:nvSpPr>
-          <p:cNvPr id="126" name="Shape 126"/>
+              <a:t>1/27: St. Angela Merici, founder of Company of St. Ursula (first women’s teaching order)</a:t>
+            </a:r>
+          </a:p>
+        </p:txBody>
+      </p:sp>
+      <p:sp>
+        <p:nvSpPr>
+          <p:cNvPr id="127" name="Shape 127"/>
           <p:cNvSpPr/>
           <p:nvPr>
             <p:ph type="body" idx="1"/>
@@ -5979,7 +6060,7 @@
       </p:grpSpPr>
       <p:sp>
         <p:nvSpPr>
-          <p:cNvPr id="128" name="Shape 128"/>
+          <p:cNvPr id="129" name="Shape 129"/>
           <p:cNvSpPr/>
           <p:nvPr>
             <p:ph type="title"/>
@@ -5996,35 +6077,42 @@
         </p:spPr>
         <p:txBody>
           <a:bodyPr/>
-          <a:lstStyle>
-            <a:lvl1pPr defTabSz="859536">
-              <a:defRPr sz="3900">
-                <a:ln w="4417"/>
+          <a:lstStyle/>
+          <a:p>
+            <a:pPr lvl="0">
+              <a:defRPr b="0" sz="1800">
+                <a:ln w="9525">
+                  <a:noFill/>
+                </a:ln>
+                <a:solidFill>
+                  <a:srgbClr val="000000"/>
+                </a:solidFill>
+                <a:effectLst/>
+              </a:defRPr>
+            </a:pPr>
+            <a:r>
+              <a:rPr b="1" sz="4200">
+                <a:ln w="5000">
+                  <a:solidFill>
+                    <a:srgbClr val="5CD4FF"/>
+                  </a:solidFill>
+                </a:ln>
+                <a:solidFill>
+                  <a:srgbClr val="9FD4E8"/>
+                </a:solidFill>
                 <a:effectLst>
-                  <a:outerShdw sx="100000" sy="100000" kx="0" ky="0" algn="b" rotWithShape="0" blurRad="50800" dist="35814" dir="5400000">
+                  <a:outerShdw sx="100000" sy="100000" kx="0" ky="0" algn="b" rotWithShape="0" blurRad="50800" dist="38100" dir="5400000">
                     <a:srgbClr val="000000">
                       <a:alpha val="50000"/>
                     </a:srgbClr>
                   </a:outerShdw>
                 </a:effectLst>
-              </a:defRPr>
-            </a:lvl1pPr>
-          </a:lstStyle>
-          <a:p>
-            <a:pPr lvl="0">
-              <a:defRPr b="0" sz="1800">
-                <a:ln w="9525">
-                  <a:noFill/>
-                </a:ln>
-                <a:solidFill>
-                  <a:srgbClr val="000000"/>
-                </a:solidFill>
-                <a:effectLst/>
-              </a:defRPr>
-            </a:pPr>
-            <a:r>
-              <a:rPr b="1" sz="3900">
-                <a:ln w="4417">
+              </a:rPr>
+              <a:t>1/29: (no feast)</a:t>
+            </a:r>
+            <a:br>
+              <a:rPr b="1" sz="4200">
+                <a:ln w="5000">
                   <a:solidFill>
                     <a:srgbClr val="5CD4FF"/>
                   </a:solidFill>
@@ -6033,21 +6121,40 @@
                   <a:srgbClr val="9FD4E8"/>
                 </a:solidFill>
                 <a:effectLst>
-                  <a:outerShdw sx="100000" sy="100000" kx="0" ky="0" algn="b" rotWithShape="0" blurRad="50800" dist="35814" dir="5400000">
+                  <a:outerShdw sx="100000" sy="100000" kx="0" ky="0" algn="b" rotWithShape="0" blurRad="50800" dist="38100" dir="5400000">
                     <a:srgbClr val="000000">
                       <a:alpha val="50000"/>
                     </a:srgbClr>
                   </a:outerShdw>
                 </a:effectLst>
               </a:rPr>
-              <a:t>2/3: St. Blase, patrom saint of those with throat ailments</a:t>
-            </a:r>
-          </a:p>
-        </p:txBody>
-      </p:sp>
-      <p:sp>
-        <p:nvSpPr>
-          <p:cNvPr id="129" name="Shape 129"/>
+            </a:br>
+            <a:r>
+              <a:rPr b="1" sz="4200">
+                <a:ln w="5000">
+                  <a:solidFill>
+                    <a:srgbClr val="5CD4FF"/>
+                  </a:solidFill>
+                </a:ln>
+                <a:solidFill>
+                  <a:srgbClr val="9FD4E8"/>
+                </a:solidFill>
+                <a:effectLst>
+                  <a:outerShdw sx="100000" sy="100000" kx="0" ky="0" algn="b" rotWithShape="0" blurRad="50800" dist="38100" dir="5400000">
+                    <a:srgbClr val="000000">
+                      <a:alpha val="50000"/>
+                    </a:srgbClr>
+                  </a:outerShdw>
+                </a:effectLst>
+              </a:rPr>
+              <a:t>SG, Bro. Juniper</a:t>
+            </a:r>
+          </a:p>
+        </p:txBody>
+      </p:sp>
+      <p:sp>
+        <p:nvSpPr>
+          <p:cNvPr id="130" name="Shape 130"/>
           <p:cNvSpPr/>
           <p:nvPr>
             <p:ph type="body" idx="1"/>
@@ -6098,7 +6205,7 @@
       </p:grpSpPr>
       <p:sp>
         <p:nvSpPr>
-          <p:cNvPr id="131" name="Shape 131"/>
+          <p:cNvPr id="132" name="Shape 132"/>
           <p:cNvSpPr/>
           <p:nvPr>
             <p:ph type="title"/>
@@ -6116,8 +6223,17 @@
         <p:txBody>
           <a:bodyPr/>
           <a:lstStyle>
-            <a:lvl1pPr>
-              <a:defRPr sz="3700"/>
+            <a:lvl1pPr defTabSz="859536">
+              <a:defRPr sz="3900">
+                <a:ln w="4417"/>
+                <a:effectLst>
+                  <a:outerShdw sx="100000" sy="100000" kx="0" ky="0" algn="b" rotWithShape="0" blurRad="50800" dist="35814" dir="5400000">
+                    <a:srgbClr val="000000">
+                      <a:alpha val="50000"/>
+                    </a:srgbClr>
+                  </a:outerShdw>
+                </a:effectLst>
+              </a:defRPr>
             </a:lvl1pPr>
           </a:lstStyle>
           <a:p>
@@ -6133,8 +6249,8 @@
               </a:defRPr>
             </a:pPr>
             <a:r>
-              <a:rPr b="1" sz="3700">
-                <a:ln w="5000">
+              <a:rPr b="1" sz="3900">
+                <a:ln w="4417">
                   <a:solidFill>
                     <a:srgbClr val="5CD4FF"/>
                   </a:solidFill>
@@ -6143,21 +6259,21 @@
                   <a:srgbClr val="9FD4E8"/>
                 </a:solidFill>
                 <a:effectLst>
-                  <a:outerShdw sx="100000" sy="100000" kx="0" ky="0" algn="b" rotWithShape="0" blurRad="50800" dist="38100" dir="5400000">
+                  <a:outerShdw sx="100000" sy="100000" kx="0" ky="0" algn="b" rotWithShape="0" blurRad="50800" dist="35814" dir="5400000">
                     <a:srgbClr val="000000">
                       <a:alpha val="50000"/>
                     </a:srgbClr>
                   </a:outerShdw>
                 </a:effectLst>
               </a:rPr>
-              <a:t>2/5: St. Agatha, patron saint of foundry workers and Alpine guides</a:t>
-            </a:r>
-          </a:p>
-        </p:txBody>
-      </p:sp>
-      <p:sp>
-        <p:nvSpPr>
-          <p:cNvPr id="132" name="Shape 132"/>
+              <a:t>2/3: St. Blase, patrom saint of those with throat ailments</a:t>
+            </a:r>
+          </a:p>
+        </p:txBody>
+      </p:sp>
+      <p:sp>
+        <p:nvSpPr>
+          <p:cNvPr id="133" name="Shape 133"/>
           <p:cNvSpPr/>
           <p:nvPr>
             <p:ph type="body" idx="1"/>
@@ -6208,7 +6324,7 @@
       </p:grpSpPr>
       <p:sp>
         <p:nvSpPr>
-          <p:cNvPr id="134" name="Shape 134"/>
+          <p:cNvPr id="135" name="Shape 135"/>
           <p:cNvSpPr/>
           <p:nvPr>
             <p:ph type="title"/>
@@ -6260,14 +6376,14 @@
                   </a:outerShdw>
                 </a:effectLst>
               </a:rPr>
-              <a:t>2/10: St. Scholastica, patron saint of nuns, and twin sister of St. Benedict</a:t>
-            </a:r>
-          </a:p>
-        </p:txBody>
-      </p:sp>
-      <p:sp>
-        <p:nvSpPr>
-          <p:cNvPr id="135" name="Shape 135"/>
+              <a:t>2/5: St. Agatha, patron saint of foundry workers and Alpine guides</a:t>
+            </a:r>
+          </a:p>
+        </p:txBody>
+      </p:sp>
+      <p:sp>
+        <p:nvSpPr>
+          <p:cNvPr id="136" name="Shape 136"/>
           <p:cNvSpPr/>
           <p:nvPr>
             <p:ph type="body" idx="1"/>
@@ -6318,7 +6434,7 @@
       </p:grpSpPr>
       <p:sp>
         <p:nvSpPr>
-          <p:cNvPr id="137" name="Shape 137"/>
+          <p:cNvPr id="138" name="Shape 138"/>
           <p:cNvSpPr/>
           <p:nvPr>
             <p:ph type="title"/>
@@ -6335,7 +6451,11 @@
         </p:spPr>
         <p:txBody>
           <a:bodyPr/>
-          <a:lstStyle/>
+          <a:lstStyle>
+            <a:lvl1pPr>
+              <a:defRPr sz="3700"/>
+            </a:lvl1pPr>
+          </a:lstStyle>
           <a:p>
             <a:pPr lvl="0">
               <a:defRPr b="0" sz="1800">
@@ -6366,53 +6486,14 @@
                   </a:outerShdw>
                 </a:effectLst>
               </a:rPr>
-              <a:t>2/12: (no feast)</a:t>
-            </a:r>
-            <a:br>
-              <a:rPr b="1" sz="3700">
-                <a:ln w="5000">
-                  <a:solidFill>
-                    <a:srgbClr val="5CD4FF"/>
-                  </a:solidFill>
-                </a:ln>
-                <a:solidFill>
-                  <a:srgbClr val="9FD4E8"/>
-                </a:solidFill>
-                <a:effectLst>
-                  <a:outerShdw sx="100000" sy="100000" kx="0" ky="0" algn="b" rotWithShape="0" blurRad="50800" dist="38100" dir="5400000">
-                    <a:srgbClr val="000000">
-                      <a:alpha val="50000"/>
-                    </a:srgbClr>
-                  </a:outerShdw>
-                </a:effectLst>
-              </a:rPr>
-            </a:br>
-            <a:r>
-              <a:rPr b="1" sz="3700">
-                <a:ln w="5000">
-                  <a:solidFill>
-                    <a:srgbClr val="5CD4FF"/>
-                  </a:solidFill>
-                </a:ln>
-                <a:solidFill>
-                  <a:srgbClr val="9FD4E8"/>
-                </a:solidFill>
-                <a:effectLst>
-                  <a:outerShdw sx="100000" sy="100000" kx="0" ky="0" algn="b" rotWithShape="0" blurRad="50800" dist="38100" dir="5400000">
-                    <a:srgbClr val="000000">
-                      <a:alpha val="50000"/>
-                    </a:srgbClr>
-                  </a:outerShdw>
-                </a:effectLst>
-              </a:rPr>
-              <a:t>St. Apollonia, patron saint of dentists</a:t>
-            </a:r>
-          </a:p>
-        </p:txBody>
-      </p:sp>
-      <p:sp>
-        <p:nvSpPr>
-          <p:cNvPr id="138" name="Shape 138"/>
+              <a:t>2/10: St. Scholastica, patron saint of nuns, and twin sister of St. Benedict</a:t>
+            </a:r>
+          </a:p>
+        </p:txBody>
+      </p:sp>
+      <p:sp>
+        <p:nvSpPr>
+          <p:cNvPr id="139" name="Shape 139"/>
           <p:cNvSpPr/>
           <p:nvPr>
             <p:ph type="body" idx="1"/>
@@ -6463,7 +6544,7 @@
       </p:grpSpPr>
       <p:sp>
         <p:nvSpPr>
-          <p:cNvPr id="140" name="Shape 140"/>
+          <p:cNvPr id="141" name="Shape 141"/>
           <p:cNvSpPr/>
           <p:nvPr>
             <p:ph type="title"/>
@@ -6494,7 +6575,7 @@
               </a:defRPr>
             </a:pPr>
             <a:r>
-              <a:rPr b="1" sz="4200">
+              <a:rPr b="1" sz="3700">
                 <a:ln w="5000">
                   <a:solidFill>
                     <a:srgbClr val="5CD4FF"/>
@@ -6511,14 +6592,53 @@
                   </a:outerShdw>
                 </a:effectLst>
               </a:rPr>
-              <a:t>2/17: Blessed Luke Belludi</a:t>
-            </a:r>
-          </a:p>
-        </p:txBody>
-      </p:sp>
-      <p:sp>
-        <p:nvSpPr>
-          <p:cNvPr id="141" name="Shape 141"/>
+              <a:t>2/12: (no feast)</a:t>
+            </a:r>
+            <a:br>
+              <a:rPr b="1" sz="3700">
+                <a:ln w="5000">
+                  <a:solidFill>
+                    <a:srgbClr val="5CD4FF"/>
+                  </a:solidFill>
+                </a:ln>
+                <a:solidFill>
+                  <a:srgbClr val="9FD4E8"/>
+                </a:solidFill>
+                <a:effectLst>
+                  <a:outerShdw sx="100000" sy="100000" kx="0" ky="0" algn="b" rotWithShape="0" blurRad="50800" dist="38100" dir="5400000">
+                    <a:srgbClr val="000000">
+                      <a:alpha val="50000"/>
+                    </a:srgbClr>
+                  </a:outerShdw>
+                </a:effectLst>
+              </a:rPr>
+            </a:br>
+            <a:r>
+              <a:rPr b="1" sz="3700">
+                <a:ln w="5000">
+                  <a:solidFill>
+                    <a:srgbClr val="5CD4FF"/>
+                  </a:solidFill>
+                </a:ln>
+                <a:solidFill>
+                  <a:srgbClr val="9FD4E8"/>
+                </a:solidFill>
+                <a:effectLst>
+                  <a:outerShdw sx="100000" sy="100000" kx="0" ky="0" algn="b" rotWithShape="0" blurRad="50800" dist="38100" dir="5400000">
+                    <a:srgbClr val="000000">
+                      <a:alpha val="50000"/>
+                    </a:srgbClr>
+                  </a:outerShdw>
+                </a:effectLst>
+              </a:rPr>
+              <a:t>St. Apollonia, patron saint of dentists</a:t>
+            </a:r>
+          </a:p>
+        </p:txBody>
+      </p:sp>
+      <p:sp>
+        <p:nvSpPr>
+          <p:cNvPr id="142" name="Shape 142"/>
           <p:cNvSpPr/>
           <p:nvPr>
             <p:ph type="body" idx="1"/>
@@ -6569,7 +6689,7 @@
       </p:grpSpPr>
       <p:sp>
         <p:nvSpPr>
-          <p:cNvPr id="143" name="Shape 143"/>
+          <p:cNvPr id="144" name="Shape 144"/>
           <p:cNvSpPr/>
           <p:nvPr>
             <p:ph type="title"/>
@@ -6617,14 +6737,14 @@
                   </a:outerShdw>
                 </a:effectLst>
               </a:rPr>
-              <a:t>2/19: St. Conrad of Piacenza, hermit</a:t>
-            </a:r>
-          </a:p>
-        </p:txBody>
-      </p:sp>
-      <p:sp>
-        <p:nvSpPr>
-          <p:cNvPr id="144" name="Shape 144"/>
+              <a:t>2/17: Blessed Luke Belludi</a:t>
+            </a:r>
+          </a:p>
+        </p:txBody>
+      </p:sp>
+      <p:sp>
+        <p:nvSpPr>
+          <p:cNvPr id="145" name="Shape 145"/>
           <p:cNvSpPr/>
           <p:nvPr>
             <p:ph type="body" idx="1"/>
@@ -6675,7 +6795,7 @@
       </p:grpSpPr>
       <p:sp>
         <p:nvSpPr>
-          <p:cNvPr id="146" name="Shape 146"/>
+          <p:cNvPr id="147" name="Shape 147"/>
           <p:cNvSpPr/>
           <p:nvPr>
             <p:ph type="title"/>
@@ -6723,14 +6843,14 @@
                   </a:outerShdw>
                 </a:effectLst>
               </a:rPr>
-              <a:t>2/24: no feast</a:t>
-            </a:r>
-          </a:p>
-        </p:txBody>
-      </p:sp>
-      <p:sp>
-        <p:nvSpPr>
-          <p:cNvPr id="147" name="Shape 147"/>
+              <a:t>2/19: St. Conrad of Piacenza, hermit</a:t>
+            </a:r>
+          </a:p>
+        </p:txBody>
+      </p:sp>
+      <p:sp>
+        <p:nvSpPr>
+          <p:cNvPr id="148" name="Shape 148"/>
           <p:cNvSpPr/>
           <p:nvPr>
             <p:ph type="body" idx="1"/>
@@ -6781,7 +6901,7 @@
       </p:grpSpPr>
       <p:sp>
         <p:nvSpPr>
-          <p:cNvPr id="149" name="Shape 149"/>
+          <p:cNvPr id="150" name="Shape 150"/>
           <p:cNvSpPr/>
           <p:nvPr>
             <p:ph type="title"/>
@@ -6829,14 +6949,14 @@
                   </a:outerShdw>
                 </a:effectLst>
               </a:rPr>
-              <a:t>2/26: St. Porphyry of Gaza, ascetic</a:t>
-            </a:r>
-          </a:p>
-        </p:txBody>
-      </p:sp>
-      <p:sp>
-        <p:nvSpPr>
-          <p:cNvPr id="150" name="Shape 150"/>
+              <a:t>2/24: no feast</a:t>
+            </a:r>
+          </a:p>
+        </p:txBody>
+      </p:sp>
+      <p:sp>
+        <p:nvSpPr>
+          <p:cNvPr id="151" name="Shape 151"/>
           <p:cNvSpPr/>
           <p:nvPr>
             <p:ph type="body" idx="1"/>
@@ -6945,7 +7065,7 @@
           <a:bodyPr/>
           <a:lstStyle/>
           <a:p>
-            <a:pPr lvl="0" marL="676654" indent="-640078">
+            <a:pPr lvl="0" marL="1103372" indent="-1066796">
               <a:defRPr sz="1800">
                 <a:solidFill>
                   <a:srgbClr val="000000"/>
@@ -6967,7 +7087,7 @@
             </a:endParaRPr>
           </a:p>
           <a:p>
-            <a:pPr lvl="0" marL="676654" indent="-640078">
+            <a:pPr lvl="0" marL="1103372" indent="-1066796">
               <a:defRPr sz="1800">
                 <a:solidFill>
                   <a:srgbClr val="000000"/>
@@ -6989,7 +7109,7 @@
             </a:endParaRPr>
           </a:p>
           <a:p>
-            <a:pPr lvl="0" marL="676654" indent="-640078">
+            <a:pPr lvl="0" marL="1103372" indent="-1066796">
               <a:defRPr sz="1800">
                 <a:solidFill>
                   <a:srgbClr val="000000"/>
@@ -7011,7 +7131,7 @@
             </a:endParaRPr>
           </a:p>
           <a:p>
-            <a:pPr lvl="0" marL="676654" indent="-640078">
+            <a:pPr lvl="0" marL="1103372" indent="-1066796">
               <a:defRPr sz="1800">
                 <a:solidFill>
                   <a:srgbClr val="000000"/>
@@ -7033,7 +7153,7 @@
             </a:endParaRPr>
           </a:p>
           <a:p>
-            <a:pPr lvl="0" marL="676654" indent="-640078">
+            <a:pPr lvl="0" marL="1103372" indent="-1066796">
               <a:defRPr sz="1800">
                 <a:solidFill>
                   <a:srgbClr val="000000"/>
@@ -7069,7 +7189,7 @@
             </a:endParaRPr>
           </a:p>
           <a:p>
-            <a:pPr lvl="0" marL="676654" indent="-640078">
+            <a:pPr lvl="0" marL="1103372" indent="-1066796">
               <a:defRPr sz="1800">
                 <a:solidFill>
                   <a:srgbClr val="000000"/>
@@ -7115,7 +7235,7 @@
       </p:grpSpPr>
       <p:sp>
         <p:nvSpPr>
-          <p:cNvPr id="152" name="Shape 152"/>
+          <p:cNvPr id="153" name="Shape 153"/>
           <p:cNvSpPr/>
           <p:nvPr>
             <p:ph type="title"/>
@@ -7132,11 +7252,7 @@
         </p:spPr>
         <p:txBody>
           <a:bodyPr/>
-          <a:lstStyle>
-            <a:lvl1pPr>
-              <a:defRPr sz="3700"/>
-            </a:lvl1pPr>
-          </a:lstStyle>
+          <a:lstStyle/>
           <a:p>
             <a:pPr lvl="0">
               <a:defRPr b="0" sz="1800">
@@ -7150,7 +7266,7 @@
               </a:defRPr>
             </a:pPr>
             <a:r>
-              <a:rPr b="1" sz="3700">
+              <a:rPr b="1" sz="4200">
                 <a:ln w="5000">
                   <a:solidFill>
                     <a:srgbClr val="5CD4FF"/>
@@ -7167,14 +7283,14 @@
                   </a:outerShdw>
                 </a:effectLst>
               </a:rPr>
-              <a:t>3/3: St. Catherine Drexel (founder of Xavier Univ. in New Orleans)</a:t>
-            </a:r>
-          </a:p>
-        </p:txBody>
-      </p:sp>
-      <p:sp>
-        <p:nvSpPr>
-          <p:cNvPr id="153" name="Shape 153"/>
+              <a:t>2/26: St. Porphyry of Gaza, ascetic</a:t>
+            </a:r>
+          </a:p>
+        </p:txBody>
+      </p:sp>
+      <p:sp>
+        <p:nvSpPr>
+          <p:cNvPr id="154" name="Shape 154"/>
           <p:cNvSpPr/>
           <p:nvPr>
             <p:ph type="body" idx="1"/>
@@ -7225,7 +7341,7 @@
       </p:grpSpPr>
       <p:sp>
         <p:nvSpPr>
-          <p:cNvPr id="155" name="Shape 155"/>
+          <p:cNvPr id="156" name="Shape 156"/>
           <p:cNvSpPr/>
           <p:nvPr>
             <p:ph type="title"/>
@@ -7242,7 +7358,11 @@
         </p:spPr>
         <p:txBody>
           <a:bodyPr/>
-          <a:lstStyle/>
+          <a:lstStyle>
+            <a:lvl1pPr>
+              <a:defRPr sz="3700"/>
+            </a:lvl1pPr>
+          </a:lstStyle>
           <a:p>
             <a:pPr lvl="0">
               <a:defRPr b="0" sz="1800">
@@ -7256,7 +7376,7 @@
               </a:defRPr>
             </a:pPr>
             <a:r>
-              <a:rPr b="1" sz="4200">
+              <a:rPr b="1" sz="3700">
                 <a:ln w="5000">
                   <a:solidFill>
                     <a:srgbClr val="5CD4FF"/>
@@ -7273,14 +7393,14 @@
                   </a:outerShdw>
                 </a:effectLst>
               </a:rPr>
-              <a:t>3/5: St. John Joseph of the Cross (noted ascetic)</a:t>
-            </a:r>
-          </a:p>
-        </p:txBody>
-      </p:sp>
-      <p:sp>
-        <p:nvSpPr>
-          <p:cNvPr id="156" name="Shape 156"/>
+              <a:t>3/3: St. Catherine Drexel (founder of Xavier Univ. in New Orleans)</a:t>
+            </a:r>
+          </a:p>
+        </p:txBody>
+      </p:sp>
+      <p:sp>
+        <p:nvSpPr>
+          <p:cNvPr id="157" name="Shape 157"/>
           <p:cNvSpPr/>
           <p:nvPr>
             <p:ph type="body" idx="1"/>
@@ -7331,7 +7451,7 @@
       </p:grpSpPr>
       <p:sp>
         <p:nvSpPr>
-          <p:cNvPr id="158" name="Shape 158"/>
+          <p:cNvPr id="159" name="Shape 159"/>
           <p:cNvSpPr/>
           <p:nvPr>
             <p:ph type="title"/>
@@ -7379,14 +7499,14 @@
                   </a:outerShdw>
                 </a:effectLst>
               </a:rPr>
-              <a:t>3/17: DUH</a:t>
-            </a:r>
-          </a:p>
-        </p:txBody>
-      </p:sp>
-      <p:sp>
-        <p:nvSpPr>
-          <p:cNvPr id="159" name="Shape 159"/>
+              <a:t>3/5: St. John Joseph of the Cross (noted ascetic)</a:t>
+            </a:r>
+          </a:p>
+        </p:txBody>
+      </p:sp>
+      <p:sp>
+        <p:nvSpPr>
+          <p:cNvPr id="160" name="Shape 160"/>
           <p:cNvSpPr/>
           <p:nvPr>
             <p:ph type="body" idx="1"/>
@@ -7437,7 +7557,7 @@
       </p:grpSpPr>
       <p:sp>
         <p:nvSpPr>
-          <p:cNvPr id="161" name="Shape 161"/>
+          <p:cNvPr id="162" name="Shape 162"/>
           <p:cNvSpPr/>
           <p:nvPr>
             <p:ph type="title"/>
@@ -7445,8 +7565,8 @@
         </p:nvSpPr>
         <p:spPr>
           <a:xfrm>
-            <a:off x="457200" y="274638"/>
-            <a:ext cx="7467600" cy="1143001"/>
+            <a:off x="685800" y="3583837"/>
+            <a:ext cx="6629400" cy="1826364"/>
           </a:xfrm>
           <a:prstGeom prst="rect">
             <a:avLst/>
@@ -7456,93 +7576,62 @@
           <a:bodyPr/>
           <a:lstStyle/>
           <a:p>
+            <a:pPr lvl="0">
+              <a:defRPr b="0" sz="1800">
+                <a:ln w="9525">
+                  <a:noFill/>
+                </a:ln>
+                <a:solidFill>
+                  <a:srgbClr val="000000"/>
+                </a:solidFill>
+                <a:effectLst/>
+              </a:defRPr>
+            </a:pPr>
+            <a:r>
+              <a:rPr b="1" sz="4200">
+                <a:ln w="5000">
+                  <a:solidFill>
+                    <a:srgbClr val="5CD4FF"/>
+                  </a:solidFill>
+                </a:ln>
+                <a:solidFill>
+                  <a:srgbClr val="9FD4E8"/>
+                </a:solidFill>
+                <a:effectLst>
+                  <a:outerShdw sx="100000" sy="100000" kx="0" ky="0" algn="b" rotWithShape="0" blurRad="50800" dist="38100" dir="5400000">
+                    <a:srgbClr val="000000">
+                      <a:alpha val="50000"/>
+                    </a:srgbClr>
+                  </a:outerShdw>
+                </a:effectLst>
+              </a:rPr>
+              <a:t>3/17: DUH</a:t>
+            </a:r>
+          </a:p>
+        </p:txBody>
+      </p:sp>
+      <p:sp>
+        <p:nvSpPr>
+          <p:cNvPr id="163" name="Shape 163"/>
+          <p:cNvSpPr/>
+          <p:nvPr>
+            <p:ph type="body" idx="1"/>
+          </p:nvPr>
+        </p:nvSpPr>
+        <p:spPr>
+          <a:xfrm>
+            <a:off x="685800" y="2485800"/>
+            <a:ext cx="6629400" cy="1066689"/>
+          </a:xfrm>
+          <a:prstGeom prst="rect">
+            <a:avLst/>
+          </a:prstGeom>
+        </p:spPr>
+        <p:txBody>
+          <a:bodyPr/>
+          <a:lstStyle/>
+          <a:p>
             <a:pPr lvl="0"/>
-          </a:p>
-        </p:txBody>
-      </p:sp>
-      <p:pic>
-        <p:nvPicPr>
-          <p:cNvPr id="162" name="image3.png"/>
-          <p:cNvPicPr/>
-          <p:nvPr/>
-        </p:nvPicPr>
-        <p:blipFill>
-          <a:blip r:embed="rId2">
-            <a:extLst/>
-          </a:blip>
-          <a:stretch>
-            <a:fillRect/>
-          </a:stretch>
-        </p:blipFill>
-        <p:spPr>
-          <a:xfrm>
-            <a:off x="23203" y="-49617"/>
-            <a:ext cx="7273726" cy="6934518"/>
-          </a:xfrm>
-          <a:prstGeom prst="rect">
-            <a:avLst/>
-          </a:prstGeom>
-          <a:ln w="12700">
-            <a:miter lim="400000"/>
-          </a:ln>
-        </p:spPr>
-      </p:pic>
-      <p:sp>
-        <p:nvSpPr>
-          <p:cNvPr id="163" name="Shape 163"/>
-          <p:cNvSpPr/>
-          <p:nvPr/>
-        </p:nvSpPr>
-        <p:spPr>
-          <a:xfrm>
-            <a:off x="5625088" y="6488667"/>
-            <a:ext cx="3395287" cy="350660"/>
-          </a:xfrm>
-          <a:prstGeom prst="rect">
-            <a:avLst/>
-          </a:prstGeom>
-          <a:ln w="12700">
-            <a:miter lim="400000"/>
-          </a:ln>
-          <a:extLst>
-            <a:ext uri="{C572A759-6A51-4108-AA02-DFA0A04FC94B}">
-              <ma14:wrappingTextBoxFlag xmlns:ma14="http://schemas.microsoft.com/office/mac/drawingml/2011/main" val="1"/>
-            </a:ext>
-          </a:extLst>
-        </p:spPr>
-        <p:txBody>
-          <a:bodyPr wrap="none" lIns="45718" tIns="45718" rIns="45718" bIns="45718">
-            <a:spAutoFit/>
-          </a:bodyPr>
-          <a:lstStyle>
-            <a:lvl1pPr>
-              <a:defRPr>
-                <a:solidFill>
-                  <a:srgbClr val="FFFFFF"/>
-                </a:solidFill>
-                <a:latin typeface="Arial"/>
-                <a:ea typeface="Arial"/>
-                <a:cs typeface="Arial"/>
-                <a:sym typeface="Arial"/>
-              </a:defRPr>
-            </a:lvl1pPr>
-          </a:lstStyle>
-          <a:p>
-            <a:pPr lvl="0">
-              <a:defRPr>
-                <a:solidFill>
-                  <a:srgbClr val="000000"/>
-                </a:solidFill>
-              </a:defRPr>
-            </a:pPr>
-            <a:r>
-              <a:rPr>
-                <a:solidFill>
-                  <a:srgbClr val="FFFFFF"/>
-                </a:solidFill>
-              </a:rPr>
-              <a:t>http://shamrocktechnologies.net/</a:t>
-            </a:r>
           </a:p>
         </p:txBody>
       </p:sp>
@@ -7582,8 +7671,8 @@
         </p:nvSpPr>
         <p:spPr>
           <a:xfrm>
-            <a:off x="685800" y="3583837"/>
-            <a:ext cx="6629400" cy="1826364"/>
+            <a:off x="457200" y="274638"/>
+            <a:ext cx="7467600" cy="1143001"/>
           </a:xfrm>
           <a:prstGeom prst="rect">
             <a:avLst/>
@@ -7591,77 +7680,95 @@
         </p:spPr>
         <p:txBody>
           <a:bodyPr/>
+          <a:lstStyle/>
+          <a:p>
+            <a:pPr lvl="0"/>
+          </a:p>
+        </p:txBody>
+      </p:sp>
+      <p:pic>
+        <p:nvPicPr>
+          <p:cNvPr id="166" name="image3.png"/>
+          <p:cNvPicPr/>
+          <p:nvPr/>
+        </p:nvPicPr>
+        <p:blipFill>
+          <a:blip r:embed="rId2">
+            <a:extLst/>
+          </a:blip>
+          <a:stretch>
+            <a:fillRect/>
+          </a:stretch>
+        </p:blipFill>
+        <p:spPr>
+          <a:xfrm>
+            <a:off x="23203" y="-49617"/>
+            <a:ext cx="7273726" cy="6934518"/>
+          </a:xfrm>
+          <a:prstGeom prst="rect">
+            <a:avLst/>
+          </a:prstGeom>
+          <a:ln w="12700">
+            <a:miter lim="400000"/>
+          </a:ln>
+        </p:spPr>
+      </p:pic>
+      <p:sp>
+        <p:nvSpPr>
+          <p:cNvPr id="167" name="Shape 167"/>
+          <p:cNvSpPr/>
+          <p:nvPr/>
+        </p:nvSpPr>
+        <p:spPr>
+          <a:xfrm>
+            <a:off x="5625088" y="6488667"/>
+            <a:ext cx="3395285" cy="350658"/>
+          </a:xfrm>
+          <a:prstGeom prst="rect">
+            <a:avLst/>
+          </a:prstGeom>
+          <a:ln w="12700">
+            <a:miter lim="400000"/>
+          </a:ln>
+          <a:extLst>
+            <a:ext uri="{C572A759-6A51-4108-AA02-DFA0A04FC94B}">
+              <ma14:wrappingTextBoxFlag xmlns:ma14="http://schemas.microsoft.com/office/mac/drawingml/2011/main" val="1"/>
+            </a:ext>
+          </a:extLst>
+        </p:spPr>
+        <p:txBody>
+          <a:bodyPr wrap="none" lIns="45718" tIns="45718" rIns="45718" bIns="45718">
+            <a:spAutoFit/>
+          </a:bodyPr>
           <a:lstStyle>
-            <a:lvl1pPr defTabSz="731519">
-              <a:defRPr sz="2900">
-                <a:ln w="3200"/>
-                <a:effectLst>
-                  <a:outerShdw sx="100000" sy="100000" kx="0" ky="0" algn="b" rotWithShape="0" blurRad="38100" dist="30480" dir="5400000">
-                    <a:srgbClr val="000000">
-                      <a:alpha val="50000"/>
-                    </a:srgbClr>
-                  </a:outerShdw>
-                </a:effectLst>
+            <a:lvl1pPr>
+              <a:defRPr>
+                <a:solidFill>
+                  <a:srgbClr val="FFFFFF"/>
+                </a:solidFill>
+                <a:latin typeface="Arial"/>
+                <a:ea typeface="Arial"/>
+                <a:cs typeface="Arial"/>
+                <a:sym typeface="Arial"/>
               </a:defRPr>
             </a:lvl1pPr>
           </a:lstStyle>
           <a:p>
             <a:pPr lvl="0">
-              <a:defRPr b="0" sz="1800">
-                <a:ln w="9525">
-                  <a:noFill/>
-                </a:ln>
-                <a:solidFill>
-                  <a:srgbClr val="000000"/>
-                </a:solidFill>
-                <a:effectLst/>
-              </a:defRPr>
-            </a:pPr>
-            <a:r>
-              <a:rPr b="1" sz="2900">
-                <a:ln w="3200">
-                  <a:solidFill>
-                    <a:srgbClr val="5CD4FF"/>
-                  </a:solidFill>
-                </a:ln>
-                <a:solidFill>
-                  <a:srgbClr val="9FD4E8"/>
-                </a:solidFill>
-                <a:effectLst>
-                  <a:outerShdw sx="100000" sy="100000" kx="0" ky="0" algn="b" rotWithShape="0" blurRad="38100" dist="30480" dir="5400000">
-                    <a:srgbClr val="000000">
-                      <a:alpha val="50000"/>
-                    </a:srgbClr>
-                  </a:outerShdw>
-                </a:effectLst>
-              </a:rPr>
-              <a:t>3/19: St. Joseph, husband of Mary and patron of Belgium, fathers, Happy Death, and Peru (among others)</a:t>
-            </a:r>
-          </a:p>
-        </p:txBody>
-      </p:sp>
-      <p:sp>
-        <p:nvSpPr>
-          <p:cNvPr id="166" name="Shape 166"/>
-          <p:cNvSpPr/>
-          <p:nvPr>
-            <p:ph type="body" idx="1"/>
-          </p:nvPr>
-        </p:nvSpPr>
-        <p:spPr>
-          <a:xfrm>
-            <a:off x="685800" y="2485800"/>
-            <a:ext cx="6629400" cy="1066689"/>
-          </a:xfrm>
-          <a:prstGeom prst="rect">
-            <a:avLst/>
-          </a:prstGeom>
-        </p:spPr>
-        <p:txBody>
-          <a:bodyPr/>
-          <a:lstStyle/>
-          <a:p>
-            <a:pPr lvl="0"/>
+              <a:defRPr>
+                <a:solidFill>
+                  <a:srgbClr val="000000"/>
+                </a:solidFill>
+              </a:defRPr>
+            </a:pPr>
+            <a:r>
+              <a:rPr>
+                <a:solidFill>
+                  <a:srgbClr val="FFFFFF"/>
+                </a:solidFill>
+              </a:rPr>
+              <a:t>http://shamrocktechnologies.net/</a:t>
+            </a:r>
           </a:p>
         </p:txBody>
       </p:sp>
@@ -7693,7 +7800,7 @@
       </p:grpSpPr>
       <p:sp>
         <p:nvSpPr>
-          <p:cNvPr id="168" name="Shape 168"/>
+          <p:cNvPr id="169" name="Shape 169"/>
           <p:cNvSpPr/>
           <p:nvPr>
             <p:ph type="title"/>
@@ -7710,7 +7817,20 @@
         </p:spPr>
         <p:txBody>
           <a:bodyPr/>
-          <a:lstStyle/>
+          <a:lstStyle>
+            <a:lvl1pPr defTabSz="731519">
+              <a:defRPr sz="2900">
+                <a:ln w="3200"/>
+                <a:effectLst>
+                  <a:outerShdw sx="100000" sy="100000" kx="0" ky="0" algn="b" rotWithShape="0" blurRad="38100" dist="30480" dir="5400000">
+                    <a:srgbClr val="000000">
+                      <a:alpha val="50000"/>
+                    </a:srgbClr>
+                  </a:outerShdw>
+                </a:effectLst>
+              </a:defRPr>
+            </a:lvl1pPr>
+          </a:lstStyle>
           <a:p>
             <a:pPr lvl="0">
               <a:defRPr b="0" sz="1800">
@@ -7724,8 +7844,8 @@
               </a:defRPr>
             </a:pPr>
             <a:r>
-              <a:rPr b="1" sz="4200">
-                <a:ln w="5000">
+              <a:rPr b="1" sz="2900">
+                <a:ln w="3200">
                   <a:solidFill>
                     <a:srgbClr val="5CD4FF"/>
                   </a:solidFill>
@@ -7734,21 +7854,21 @@
                   <a:srgbClr val="9FD4E8"/>
                 </a:solidFill>
                 <a:effectLst>
-                  <a:outerShdw sx="100000" sy="100000" kx="0" ky="0" algn="b" rotWithShape="0" blurRad="50800" dist="38100" dir="5400000">
+                  <a:outerShdw sx="100000" sy="100000" kx="0" ky="0" algn="b" rotWithShape="0" blurRad="38100" dist="30480" dir="5400000">
                     <a:srgbClr val="000000">
                       <a:alpha val="50000"/>
                     </a:srgbClr>
                   </a:outerShdw>
                 </a:effectLst>
               </a:rPr>
-              <a:t>3/24: St. Catherine of Genoa</a:t>
-            </a:r>
-          </a:p>
-        </p:txBody>
-      </p:sp>
-      <p:sp>
-        <p:nvSpPr>
-          <p:cNvPr id="169" name="Shape 169"/>
+              <a:t>3/19: St. Joseph, husband of Mary and patron of Belgium, fathers, Happy Death, and Peru (among others)</a:t>
+            </a:r>
+          </a:p>
+        </p:txBody>
+      </p:sp>
+      <p:sp>
+        <p:nvSpPr>
+          <p:cNvPr id="170" name="Shape 170"/>
           <p:cNvSpPr/>
           <p:nvPr>
             <p:ph type="body" idx="1"/>
@@ -7799,7 +7919,7 @@
       </p:grpSpPr>
       <p:sp>
         <p:nvSpPr>
-          <p:cNvPr id="171" name="Shape 171"/>
+          <p:cNvPr id="172" name="Shape 172"/>
           <p:cNvSpPr/>
           <p:nvPr>
             <p:ph type="title"/>
@@ -7830,7 +7950,7 @@
               </a:defRPr>
             </a:pPr>
             <a:r>
-              <a:rPr b="1" sz="3700">
+              <a:rPr b="1" sz="4200">
                 <a:ln w="5000">
                   <a:solidFill>
                     <a:srgbClr val="5CD4FF"/>
@@ -7847,53 +7967,14 @@
                   </a:outerShdw>
                 </a:effectLst>
               </a:rPr>
-              <a:t>3/26: (no feast)</a:t>
-            </a:r>
-            <a:br>
-              <a:rPr b="1" sz="3700">
-                <a:ln w="5000">
-                  <a:solidFill>
-                    <a:srgbClr val="5CD4FF"/>
-                  </a:solidFill>
-                </a:ln>
-                <a:solidFill>
-                  <a:srgbClr val="9FD4E8"/>
-                </a:solidFill>
-                <a:effectLst>
-                  <a:outerShdw sx="100000" sy="100000" kx="0" ky="0" algn="b" rotWithShape="0" blurRad="50800" dist="38100" dir="5400000">
-                    <a:srgbClr val="000000">
-                      <a:alpha val="50000"/>
-                    </a:srgbClr>
-                  </a:outerShdw>
-                </a:effectLst>
-              </a:rPr>
-            </a:br>
-            <a:r>
-              <a:rPr b="1" sz="3700">
-                <a:ln w="5000">
-                  <a:solidFill>
-                    <a:srgbClr val="5CD4FF"/>
-                  </a:solidFill>
-                </a:ln>
-                <a:solidFill>
-                  <a:srgbClr val="9FD4E8"/>
-                </a:solidFill>
-                <a:effectLst>
-                  <a:outerShdw sx="100000" sy="100000" kx="0" ky="0" algn="b" rotWithShape="0" blurRad="50800" dist="38100" dir="5400000">
-                    <a:srgbClr val="000000">
-                      <a:alpha val="50000"/>
-                    </a:srgbClr>
-                  </a:outerShdw>
-                </a:effectLst>
-              </a:rPr>
-              <a:t>Blessed Didacus Joseph of Cadiz, preacher</a:t>
-            </a:r>
-          </a:p>
-        </p:txBody>
-      </p:sp>
-      <p:sp>
-        <p:nvSpPr>
-          <p:cNvPr id="172" name="Shape 172"/>
+              <a:t>3/24: St. Catherine of Genoa</a:t>
+            </a:r>
+          </a:p>
+        </p:txBody>
+      </p:sp>
+      <p:sp>
+        <p:nvSpPr>
+          <p:cNvPr id="173" name="Shape 173"/>
           <p:cNvSpPr/>
           <p:nvPr>
             <p:ph type="body" idx="1"/>
@@ -7944,7 +8025,7 @@
       </p:grpSpPr>
       <p:sp>
         <p:nvSpPr>
-          <p:cNvPr id="174" name="Shape 174"/>
+          <p:cNvPr id="175" name="Shape 175"/>
           <p:cNvSpPr/>
           <p:nvPr>
             <p:ph type="title"/>
@@ -7975,7 +8056,7 @@
               </a:defRPr>
             </a:pPr>
             <a:r>
-              <a:rPr b="1" sz="4200">
+              <a:rPr b="1" sz="3700">
                 <a:ln w="5000">
                   <a:solidFill>
                     <a:srgbClr val="5CD4FF"/>
@@ -7992,14 +8073,53 @@
                   </a:outerShdw>
                 </a:effectLst>
               </a:rPr>
-              <a:t>3/31: St. Stephen of Mar Saba, hermit</a:t>
-            </a:r>
-          </a:p>
-        </p:txBody>
-      </p:sp>
-      <p:sp>
-        <p:nvSpPr>
-          <p:cNvPr id="175" name="Shape 175"/>
+              <a:t>3/26: (no feast)</a:t>
+            </a:r>
+            <a:br>
+              <a:rPr b="1" sz="3700">
+                <a:ln w="5000">
+                  <a:solidFill>
+                    <a:srgbClr val="5CD4FF"/>
+                  </a:solidFill>
+                </a:ln>
+                <a:solidFill>
+                  <a:srgbClr val="9FD4E8"/>
+                </a:solidFill>
+                <a:effectLst>
+                  <a:outerShdw sx="100000" sy="100000" kx="0" ky="0" algn="b" rotWithShape="0" blurRad="50800" dist="38100" dir="5400000">
+                    <a:srgbClr val="000000">
+                      <a:alpha val="50000"/>
+                    </a:srgbClr>
+                  </a:outerShdw>
+                </a:effectLst>
+              </a:rPr>
+            </a:br>
+            <a:r>
+              <a:rPr b="1" sz="3700">
+                <a:ln w="5000">
+                  <a:solidFill>
+                    <a:srgbClr val="5CD4FF"/>
+                  </a:solidFill>
+                </a:ln>
+                <a:solidFill>
+                  <a:srgbClr val="9FD4E8"/>
+                </a:solidFill>
+                <a:effectLst>
+                  <a:outerShdw sx="100000" sy="100000" kx="0" ky="0" algn="b" rotWithShape="0" blurRad="50800" dist="38100" dir="5400000">
+                    <a:srgbClr val="000000">
+                      <a:alpha val="50000"/>
+                    </a:srgbClr>
+                  </a:outerShdw>
+                </a:effectLst>
+              </a:rPr>
+              <a:t>Blessed Didacus Joseph of Cadiz, preacher</a:t>
+            </a:r>
+          </a:p>
+        </p:txBody>
+      </p:sp>
+      <p:sp>
+        <p:nvSpPr>
+          <p:cNvPr id="176" name="Shape 176"/>
           <p:cNvSpPr/>
           <p:nvPr>
             <p:ph type="body" idx="1"/>
@@ -8050,7 +8170,7 @@
       </p:grpSpPr>
       <p:sp>
         <p:nvSpPr>
-          <p:cNvPr id="177" name="Shape 177"/>
+          <p:cNvPr id="178" name="Shape 178"/>
           <p:cNvSpPr/>
           <p:nvPr>
             <p:ph type="title"/>
@@ -8067,58 +8187,45 @@
         </p:spPr>
         <p:txBody>
           <a:bodyPr/>
-          <a:lstStyle>
-            <a:lvl1pPr defTabSz="859536">
-              <a:defRPr sz="3400">
-                <a:ln w="4417"/>
+          <a:lstStyle/>
+          <a:p>
+            <a:pPr lvl="0">
+              <a:defRPr b="0" sz="1800">
+                <a:ln w="9525">
+                  <a:noFill/>
+                </a:ln>
+                <a:solidFill>
+                  <a:srgbClr val="000000"/>
+                </a:solidFill>
+                <a:effectLst/>
+              </a:defRPr>
+            </a:pPr>
+            <a:r>
+              <a:rPr b="1" sz="4200">
+                <a:ln w="5000">
+                  <a:solidFill>
+                    <a:srgbClr val="5CD4FF"/>
+                  </a:solidFill>
+                </a:ln>
+                <a:solidFill>
+                  <a:srgbClr val="9FD4E8"/>
+                </a:solidFill>
                 <a:effectLst>
-                  <a:outerShdw sx="100000" sy="100000" kx="0" ky="0" algn="b" rotWithShape="0" blurRad="50800" dist="35814" dir="5400000">
+                  <a:outerShdw sx="100000" sy="100000" kx="0" ky="0" algn="b" rotWithShape="0" blurRad="50800" dist="38100" dir="5400000">
                     <a:srgbClr val="000000">
                       <a:alpha val="50000"/>
                     </a:srgbClr>
                   </a:outerShdw>
                 </a:effectLst>
-              </a:defRPr>
-            </a:lvl1pPr>
-          </a:lstStyle>
-          <a:p>
-            <a:pPr lvl="0">
-              <a:defRPr b="0" sz="1800">
-                <a:ln w="9525">
-                  <a:noFill/>
-                </a:ln>
-                <a:solidFill>
-                  <a:srgbClr val="000000"/>
-                </a:solidFill>
-                <a:effectLst/>
-              </a:defRPr>
-            </a:pPr>
-            <a:r>
-              <a:rPr b="1" sz="3400">
-                <a:ln w="4417">
-                  <a:solidFill>
-                    <a:srgbClr val="5CD4FF"/>
-                  </a:solidFill>
-                </a:ln>
-                <a:solidFill>
-                  <a:srgbClr val="9FD4E8"/>
-                </a:solidFill>
-                <a:effectLst>
-                  <a:outerShdw sx="100000" sy="100000" kx="0" ky="0" algn="b" rotWithShape="0" blurRad="50800" dist="35814" dir="5400000">
-                    <a:srgbClr val="000000">
-                      <a:alpha val="50000"/>
-                    </a:srgbClr>
-                  </a:outerShdw>
-                </a:effectLst>
-              </a:rPr>
-              <a:t>4/2: St. Francis of Paola, patron of sailors and founder of  Hermits of St. Francis of Assisi</a:t>
-            </a:r>
-          </a:p>
-        </p:txBody>
-      </p:sp>
-      <p:sp>
-        <p:nvSpPr>
-          <p:cNvPr id="178" name="Shape 178"/>
+              </a:rPr>
+              <a:t>3/31: St. Stephen of Mar Saba, hermit</a:t>
+            </a:r>
+          </a:p>
+        </p:txBody>
+      </p:sp>
+      <p:sp>
+        <p:nvSpPr>
+          <p:cNvPr id="179" name="Shape 179"/>
           <p:cNvSpPr/>
           <p:nvPr>
             <p:ph type="body" idx="1"/>
@@ -8169,7 +8276,7 @@
       </p:grpSpPr>
       <p:sp>
         <p:nvSpPr>
-          <p:cNvPr id="180" name="Shape 180"/>
+          <p:cNvPr id="181" name="Shape 181"/>
           <p:cNvSpPr/>
           <p:nvPr>
             <p:ph type="title"/>
@@ -8187,11 +8294,11 @@
         <p:txBody>
           <a:bodyPr/>
           <a:lstStyle>
-            <a:lvl1pPr defTabSz="886967">
-              <a:defRPr sz="3500">
-                <a:ln w="4703"/>
+            <a:lvl1pPr defTabSz="859536">
+              <a:defRPr sz="3400">
+                <a:ln w="4417"/>
                 <a:effectLst>
-                  <a:outerShdw sx="100000" sy="100000" kx="0" ky="0" algn="b" rotWithShape="0" blurRad="50800" dist="36957" dir="5400000">
+                  <a:outerShdw sx="100000" sy="100000" kx="0" ky="0" algn="b" rotWithShape="0" blurRad="50800" dist="35814" dir="5400000">
                     <a:srgbClr val="000000">
                       <a:alpha val="50000"/>
                     </a:srgbClr>
@@ -8213,8 +8320,8 @@
               </a:defRPr>
             </a:pPr>
             <a:r>
-              <a:rPr b="1" sz="3500">
-                <a:ln w="4703">
+              <a:rPr b="1" sz="3400">
+                <a:ln w="4417">
                   <a:solidFill>
                     <a:srgbClr val="5CD4FF"/>
                   </a:solidFill>
@@ -8223,21 +8330,21 @@
                   <a:srgbClr val="9FD4E8"/>
                 </a:solidFill>
                 <a:effectLst>
-                  <a:outerShdw sx="100000" sy="100000" kx="0" ky="0" algn="b" rotWithShape="0" blurRad="50800" dist="36957" dir="5400000">
+                  <a:outerShdw sx="100000" sy="100000" kx="0" ky="0" algn="b" rotWithShape="0" blurRad="50800" dist="35814" dir="5400000">
                     <a:srgbClr val="000000">
                       <a:alpha val="50000"/>
                     </a:srgbClr>
                   </a:outerShdw>
                 </a:effectLst>
               </a:rPr>
-              <a:t>4/7: St. John Baptist de la Salle, patron saint of teachers, founder of Christian Brothers</a:t>
-            </a:r>
-          </a:p>
-        </p:txBody>
-      </p:sp>
-      <p:sp>
-        <p:nvSpPr>
-          <p:cNvPr id="181" name="Shape 181"/>
+              <a:t>4/2: St. Francis of Paola, patron of sailors and founder of  Hermits of St. Francis of Assisi</a:t>
+            </a:r>
+          </a:p>
+        </p:txBody>
+      </p:sp>
+      <p:sp>
+        <p:nvSpPr>
+          <p:cNvPr id="182" name="Shape 182"/>
           <p:cNvSpPr/>
           <p:nvPr>
             <p:ph type="body" idx="1"/>
@@ -8346,7 +8453,7 @@
           <a:bodyPr/>
           <a:lstStyle/>
           <a:p>
-            <a:pPr lvl="0" marL="676654" indent="-640078">
+            <a:pPr lvl="0" marL="1103372" indent="-1066796">
               <a:defRPr sz="1800">
                 <a:solidFill>
                   <a:srgbClr val="000000"/>
@@ -8368,7 +8475,7 @@
             </a:endParaRPr>
           </a:p>
           <a:p>
-            <a:pPr lvl="1" marL="844296" indent="-396240">
+            <a:pPr lvl="1" marL="1020402" indent="-572346">
               <a:spcBef>
                 <a:spcPts val="600"/>
               </a:spcBef>
@@ -8389,7 +8496,7 @@
             <a:endParaRPr sz="2600"/>
           </a:p>
           <a:p>
-            <a:pPr lvl="2" marL="1091182" indent="-341374">
+            <a:pPr lvl="2" marL="1204973" indent="-455165">
               <a:spcBef>
                 <a:spcPts val="500"/>
               </a:spcBef>
@@ -8414,7 +8521,7 @@
             <a:endParaRPr sz="2400"/>
           </a:p>
           <a:p>
-            <a:pPr lvl="1" marL="844296" indent="-396240">
+            <a:pPr lvl="1" marL="1020402" indent="-572346">
               <a:spcBef>
                 <a:spcPts val="600"/>
               </a:spcBef>
@@ -8435,7 +8542,7 @@
             <a:endParaRPr sz="2600"/>
           </a:p>
           <a:p>
-            <a:pPr lvl="0" marL="676654" indent="-640078">
+            <a:pPr lvl="0" marL="1103372" indent="-1066796">
               <a:defRPr sz="1800">
                 <a:solidFill>
                   <a:srgbClr val="000000"/>
@@ -8481,7 +8588,7 @@
       </p:grpSpPr>
       <p:sp>
         <p:nvSpPr>
-          <p:cNvPr id="183" name="Shape 183"/>
+          <p:cNvPr id="184" name="Shape 184"/>
           <p:cNvSpPr/>
           <p:nvPr>
             <p:ph type="title"/>
@@ -8498,7 +8605,20 @@
         </p:spPr>
         <p:txBody>
           <a:bodyPr/>
-          <a:lstStyle/>
+          <a:lstStyle>
+            <a:lvl1pPr defTabSz="886966">
+              <a:defRPr sz="3500">
+                <a:ln w="4702"/>
+                <a:effectLst>
+                  <a:outerShdw sx="100000" sy="100000" kx="0" ky="0" algn="b" rotWithShape="0" blurRad="50800" dist="36957" dir="5400000">
+                    <a:srgbClr val="000000">
+                      <a:alpha val="50000"/>
+                    </a:srgbClr>
+                  </a:outerShdw>
+                </a:effectLst>
+              </a:defRPr>
+            </a:lvl1pPr>
+          </a:lstStyle>
           <a:p>
             <a:pPr lvl="0">
               <a:defRPr b="0" sz="1800">
@@ -8512,8 +8632,8 @@
               </a:defRPr>
             </a:pPr>
             <a:r>
-              <a:rPr b="1" sz="4200">
-                <a:ln w="5000">
+              <a:rPr b="1" sz="3500">
+                <a:ln w="4702">
                   <a:solidFill>
                     <a:srgbClr val="5CD4FF"/>
                   </a:solidFill>
@@ -8522,21 +8642,21 @@
                   <a:srgbClr val="9FD4E8"/>
                 </a:solidFill>
                 <a:effectLst>
-                  <a:outerShdw sx="100000" sy="100000" kx="0" ky="0" algn="b" rotWithShape="0" blurRad="50800" dist="38100" dir="5400000">
+                  <a:outerShdw sx="100000" sy="100000" kx="0" ky="0" algn="b" rotWithShape="0" blurRad="50800" dist="36957" dir="5400000">
                     <a:srgbClr val="000000">
                       <a:alpha val="50000"/>
                     </a:srgbClr>
                   </a:outerShdw>
                 </a:effectLst>
               </a:rPr>
-              <a:t>4/9: St. Casilda, convert</a:t>
-            </a:r>
-          </a:p>
-        </p:txBody>
-      </p:sp>
-      <p:sp>
-        <p:nvSpPr>
-          <p:cNvPr id="184" name="Shape 184"/>
+              <a:t>4/7: St. John Baptist de la Salle, patron saint of teachers, founder of Christian Brothers</a:t>
+            </a:r>
+          </a:p>
+        </p:txBody>
+      </p:sp>
+      <p:sp>
+        <p:nvSpPr>
+          <p:cNvPr id="185" name="Shape 185"/>
           <p:cNvSpPr/>
           <p:nvPr>
             <p:ph type="body" idx="1"/>
@@ -8587,7 +8707,7 @@
       </p:grpSpPr>
       <p:sp>
         <p:nvSpPr>
-          <p:cNvPr id="186" name="Shape 186"/>
+          <p:cNvPr id="187" name="Shape 187"/>
           <p:cNvSpPr/>
           <p:nvPr>
             <p:ph type="title"/>
@@ -8604,11 +8724,7 @@
         </p:spPr>
         <p:txBody>
           <a:bodyPr/>
-          <a:lstStyle>
-            <a:lvl1pPr>
-              <a:defRPr sz="3700"/>
-            </a:lvl1pPr>
-          </a:lstStyle>
+          <a:lstStyle/>
           <a:p>
             <a:pPr lvl="0">
               <a:defRPr b="0" sz="1800">
@@ -8622,7 +8738,7 @@
               </a:defRPr>
             </a:pPr>
             <a:r>
-              <a:rPr b="1" sz="3700">
+              <a:rPr b="1" sz="4200">
                 <a:ln w="5000">
                   <a:solidFill>
                     <a:srgbClr val="5CD4FF"/>
@@ -8639,14 +8755,14 @@
                   </a:outerShdw>
                 </a:effectLst>
               </a:rPr>
-              <a:t>4/14: Blessed Peter Gonzalez (another patron of sailors)</a:t>
-            </a:r>
-          </a:p>
-        </p:txBody>
-      </p:sp>
-      <p:sp>
-        <p:nvSpPr>
-          <p:cNvPr id="187" name="Shape 187"/>
+              <a:t>4/9: St. Casilda, convert</a:t>
+            </a:r>
+          </a:p>
+        </p:txBody>
+      </p:sp>
+      <p:sp>
+        <p:nvSpPr>
+          <p:cNvPr id="188" name="Shape 188"/>
           <p:cNvSpPr/>
           <p:nvPr>
             <p:ph type="body" idx="1"/>
@@ -8697,7 +8813,7 @@
       </p:grpSpPr>
       <p:sp>
         <p:nvSpPr>
-          <p:cNvPr id="189" name="Shape 189"/>
+          <p:cNvPr id="190" name="Shape 190"/>
           <p:cNvSpPr/>
           <p:nvPr>
             <p:ph type="title"/>
@@ -8714,7 +8830,11 @@
         </p:spPr>
         <p:txBody>
           <a:bodyPr/>
-          <a:lstStyle/>
+          <a:lstStyle>
+            <a:lvl1pPr>
+              <a:defRPr sz="3700"/>
+            </a:lvl1pPr>
+          </a:lstStyle>
           <a:p>
             <a:pPr lvl="0">
               <a:defRPr b="0" sz="1800">
@@ -8728,7 +8848,7 @@
               </a:defRPr>
             </a:pPr>
             <a:r>
-              <a:rPr b="1" sz="4200">
+              <a:rPr b="1" sz="3700">
                 <a:ln w="5000">
                   <a:solidFill>
                     <a:srgbClr val="5CD4FF"/>
@@ -8745,14 +8865,14 @@
                   </a:outerShdw>
                 </a:effectLst>
               </a:rPr>
-              <a:t>4/16: St. Bernadette Soubiros</a:t>
-            </a:r>
-          </a:p>
-        </p:txBody>
-      </p:sp>
-      <p:sp>
-        <p:nvSpPr>
-          <p:cNvPr id="190" name="Shape 190"/>
+              <a:t>4/14: Blessed Peter Gonzalez (another patron of sailors)</a:t>
+            </a:r>
+          </a:p>
+        </p:txBody>
+      </p:sp>
+      <p:sp>
+        <p:nvSpPr>
+          <p:cNvPr id="191" name="Shape 191"/>
           <p:cNvSpPr/>
           <p:nvPr>
             <p:ph type="body" idx="1"/>
@@ -8803,7 +8923,7 @@
       </p:grpSpPr>
       <p:sp>
         <p:nvSpPr>
-          <p:cNvPr id="192" name="Shape 192"/>
+          <p:cNvPr id="193" name="Shape 193"/>
           <p:cNvSpPr/>
           <p:nvPr>
             <p:ph type="title"/>
@@ -8851,14 +8971,14 @@
                   </a:outerShdw>
                 </a:effectLst>
               </a:rPr>
-              <a:t>4/21: St. Anselm, father of Scholasticism</a:t>
-            </a:r>
-          </a:p>
-        </p:txBody>
-      </p:sp>
-      <p:sp>
-        <p:nvSpPr>
-          <p:cNvPr id="193" name="Shape 193"/>
+              <a:t>4/16: St. Bernadette Soubiros</a:t>
+            </a:r>
+          </a:p>
+        </p:txBody>
+      </p:sp>
+      <p:sp>
+        <p:nvSpPr>
+          <p:cNvPr id="194" name="Shape 194"/>
           <p:cNvSpPr/>
           <p:nvPr>
             <p:ph type="body" idx="1"/>
@@ -8909,7 +9029,7 @@
       </p:grpSpPr>
       <p:sp>
         <p:nvSpPr>
-          <p:cNvPr id="195" name="Shape 195"/>
+          <p:cNvPr id="196" name="Shape 196"/>
           <p:cNvSpPr/>
           <p:nvPr>
             <p:ph type="title"/>
@@ -8926,58 +9046,45 @@
         </p:spPr>
         <p:txBody>
           <a:bodyPr/>
-          <a:lstStyle>
-            <a:lvl1pPr defTabSz="859536">
-              <a:defRPr sz="3900">
-                <a:ln w="4417"/>
+          <a:lstStyle/>
+          <a:p>
+            <a:pPr lvl="0">
+              <a:defRPr b="0" sz="1800">
+                <a:ln w="9525">
+                  <a:noFill/>
+                </a:ln>
+                <a:solidFill>
+                  <a:srgbClr val="000000"/>
+                </a:solidFill>
+                <a:effectLst/>
+              </a:defRPr>
+            </a:pPr>
+            <a:r>
+              <a:rPr b="1" sz="4200">
+                <a:ln w="5000">
+                  <a:solidFill>
+                    <a:srgbClr val="5CD4FF"/>
+                  </a:solidFill>
+                </a:ln>
+                <a:solidFill>
+                  <a:srgbClr val="9FD4E8"/>
+                </a:solidFill>
                 <a:effectLst>
-                  <a:outerShdw sx="100000" sy="100000" kx="0" ky="0" algn="b" rotWithShape="0" blurRad="50800" dist="35814" dir="5400000">
+                  <a:outerShdw sx="100000" sy="100000" kx="0" ky="0" algn="b" rotWithShape="0" blurRad="50800" dist="38100" dir="5400000">
                     <a:srgbClr val="000000">
                       <a:alpha val="50000"/>
                     </a:srgbClr>
                   </a:outerShdw>
                 </a:effectLst>
-              </a:defRPr>
-            </a:lvl1pPr>
-          </a:lstStyle>
-          <a:p>
-            <a:pPr lvl="0">
-              <a:defRPr b="0" sz="1800">
-                <a:ln w="9525">
-                  <a:noFill/>
-                </a:ln>
-                <a:solidFill>
-                  <a:srgbClr val="000000"/>
-                </a:solidFill>
-                <a:effectLst/>
-              </a:defRPr>
-            </a:pPr>
-            <a:r>
-              <a:rPr b="1" sz="3900">
-                <a:ln w="4417">
-                  <a:solidFill>
-                    <a:srgbClr val="5CD4FF"/>
-                  </a:solidFill>
-                </a:ln>
-                <a:solidFill>
-                  <a:srgbClr val="9FD4E8"/>
-                </a:solidFill>
-                <a:effectLst>
-                  <a:outerShdw sx="100000" sy="100000" kx="0" ky="0" algn="b" rotWithShape="0" blurRad="50800" dist="35814" dir="5400000">
-                    <a:srgbClr val="000000">
-                      <a:alpha val="50000"/>
-                    </a:srgbClr>
-                  </a:outerShdw>
-                </a:effectLst>
-              </a:rPr>
-              <a:t>2/23: St. George, martyr and patron of England, etc.)</a:t>
-            </a:r>
-          </a:p>
-        </p:txBody>
-      </p:sp>
-      <p:sp>
-        <p:nvSpPr>
-          <p:cNvPr id="196" name="Shape 196"/>
+              </a:rPr>
+              <a:t>4/21: St. Anselm, father of Scholasticism</a:t>
+            </a:r>
+          </a:p>
+        </p:txBody>
+      </p:sp>
+      <p:sp>
+        <p:nvSpPr>
+          <p:cNvPr id="197" name="Shape 197"/>
           <p:cNvSpPr/>
           <p:nvPr>
             <p:ph type="body" idx="1"/>
@@ -9028,7 +9135,126 @@
       </p:grpSpPr>
       <p:sp>
         <p:nvSpPr>
-          <p:cNvPr id="198" name="Shape 198"/>
+          <p:cNvPr id="199" name="Shape 199"/>
+          <p:cNvSpPr/>
+          <p:nvPr>
+            <p:ph type="title"/>
+          </p:nvPr>
+        </p:nvSpPr>
+        <p:spPr>
+          <a:xfrm>
+            <a:off x="685800" y="3583837"/>
+            <a:ext cx="6629400" cy="1826364"/>
+          </a:xfrm>
+          <a:prstGeom prst="rect">
+            <a:avLst/>
+          </a:prstGeom>
+        </p:spPr>
+        <p:txBody>
+          <a:bodyPr/>
+          <a:lstStyle>
+            <a:lvl1pPr defTabSz="859536">
+              <a:defRPr sz="3900">
+                <a:ln w="4417"/>
+                <a:effectLst>
+                  <a:outerShdw sx="100000" sy="100000" kx="0" ky="0" algn="b" rotWithShape="0" blurRad="50800" dist="35814" dir="5400000">
+                    <a:srgbClr val="000000">
+                      <a:alpha val="50000"/>
+                    </a:srgbClr>
+                  </a:outerShdw>
+                </a:effectLst>
+              </a:defRPr>
+            </a:lvl1pPr>
+          </a:lstStyle>
+          <a:p>
+            <a:pPr lvl="0">
+              <a:defRPr b="0" sz="1800">
+                <a:ln w="9525">
+                  <a:noFill/>
+                </a:ln>
+                <a:solidFill>
+                  <a:srgbClr val="000000"/>
+                </a:solidFill>
+                <a:effectLst/>
+              </a:defRPr>
+            </a:pPr>
+            <a:r>
+              <a:rPr b="1" sz="3900">
+                <a:ln w="4417">
+                  <a:solidFill>
+                    <a:srgbClr val="5CD4FF"/>
+                  </a:solidFill>
+                </a:ln>
+                <a:solidFill>
+                  <a:srgbClr val="9FD4E8"/>
+                </a:solidFill>
+                <a:effectLst>
+                  <a:outerShdw sx="100000" sy="100000" kx="0" ky="0" algn="b" rotWithShape="0" blurRad="50800" dist="35814" dir="5400000">
+                    <a:srgbClr val="000000">
+                      <a:alpha val="50000"/>
+                    </a:srgbClr>
+                  </a:outerShdw>
+                </a:effectLst>
+              </a:rPr>
+              <a:t>2/23: St. George, martyr and patron of England, etc.)</a:t>
+            </a:r>
+          </a:p>
+        </p:txBody>
+      </p:sp>
+      <p:sp>
+        <p:nvSpPr>
+          <p:cNvPr id="200" name="Shape 200"/>
+          <p:cNvSpPr/>
+          <p:nvPr>
+            <p:ph type="body" idx="1"/>
+          </p:nvPr>
+        </p:nvSpPr>
+        <p:spPr>
+          <a:xfrm>
+            <a:off x="685800" y="2485800"/>
+            <a:ext cx="6629400" cy="1066689"/>
+          </a:xfrm>
+          <a:prstGeom prst="rect">
+            <a:avLst/>
+          </a:prstGeom>
+        </p:spPr>
+        <p:txBody>
+          <a:bodyPr/>
+          <a:lstStyle/>
+          <a:p>
+            <a:pPr lvl="0"/>
+          </a:p>
+        </p:txBody>
+      </p:sp>
+    </p:spTree>
+  </p:cSld>
+  <p:clrMapOvr>
+    <a:masterClrMapping/>
+  </p:clrMapOvr>
+  <p:transition spd="med" advClick="1"/>
+</p:sld>
+</file>
+
+<file path=ppt/slides/slide46.xml><?xml version="1.0" encoding="utf-8"?>
+<p:sld xmlns:a="http://schemas.openxmlformats.org/drawingml/2006/main" xmlns:r="http://schemas.openxmlformats.org/officeDocument/2006/relationships" xmlns:p="http://schemas.openxmlformats.org/presentationml/2006/main" showMasterSp="1" showMasterPhAnim="1">
+  <p:cSld>
+    <p:spTree>
+      <p:nvGrpSpPr>
+        <p:cNvPr id="1" name=""/>
+        <p:cNvGrpSpPr/>
+        <p:nvPr/>
+      </p:nvGrpSpPr>
+      <p:grpSpPr>
+        <a:xfrm>
+          <a:off x="0" y="0"/>
+          <a:ext cx="0" cy="0"/>
+          <a:chOff x="0" y="0"/>
+          <a:chExt cx="0" cy="0"/>
+        </a:xfrm>
+      </p:grpSpPr>
+      <p:sp>
+        <p:nvSpPr>
+          <p:cNvPr id="202" name="Shape 202"/>
           <p:cNvSpPr/>
           <p:nvPr>
             <p:ph type="title"/>
@@ -9087,7 +9313,7 @@
       </p:sp>
       <p:sp>
         <p:nvSpPr>
-          <p:cNvPr id="199" name="Shape 199"/>
+          <p:cNvPr id="203" name="Shape 203"/>
           <p:cNvSpPr/>
           <p:nvPr>
             <p:ph type="body" idx="1"/>
@@ -9196,7 +9422,7 @@
           <a:bodyPr/>
           <a:lstStyle/>
           <a:p>
-            <a:pPr lvl="0" marL="676654" indent="-640078">
+            <a:pPr lvl="0" marL="1103372" indent="-1066796">
               <a:defRPr sz="1800">
                 <a:solidFill>
                   <a:srgbClr val="000000"/>
@@ -9218,7 +9444,7 @@
             </a:endParaRPr>
           </a:p>
           <a:p>
-            <a:pPr lvl="0" marL="676654" indent="-640078">
+            <a:pPr lvl="0" marL="1103372" indent="-1066796">
               <a:defRPr sz="1800">
                 <a:solidFill>
                   <a:srgbClr val="000000"/>
@@ -9428,7 +9654,7 @@
           <a:bodyPr/>
           <a:lstStyle/>
           <a:p>
-            <a:pPr lvl="0" marL="676654" indent="-640078">
+            <a:pPr lvl="0" marL="1103372" indent="-1066796">
               <a:defRPr sz="1800">
                 <a:solidFill>
                   <a:srgbClr val="000000"/>
@@ -9450,7 +9676,7 @@
             </a:endParaRPr>
           </a:p>
           <a:p>
-            <a:pPr lvl="1" marL="844296" indent="-396240">
+            <a:pPr lvl="1" marL="1020402" indent="-572346">
               <a:spcBef>
                 <a:spcPts val="600"/>
               </a:spcBef>
@@ -9471,7 +9697,7 @@
             <a:endParaRPr sz="2600"/>
           </a:p>
           <a:p>
-            <a:pPr lvl="1" marL="844296" indent="-396240">
+            <a:pPr lvl="1" marL="1020402" indent="-572346">
               <a:spcBef>
                 <a:spcPts val="600"/>
               </a:spcBef>
@@ -9631,7 +9857,7 @@
           <a:bodyPr/>
           <a:lstStyle/>
           <a:p>
-            <a:pPr lvl="0" marL="676654" indent="-640078">
+            <a:pPr lvl="0" marL="1103372" indent="-1066796">
               <a:defRPr sz="1800">
                 <a:solidFill>
                   <a:srgbClr val="000000"/>
@@ -9653,7 +9879,7 @@
             </a:endParaRPr>
           </a:p>
           <a:p>
-            <a:pPr lvl="0" marL="676654" indent="-640078">
+            <a:pPr lvl="0" marL="1103372" indent="-1066796">
               <a:defRPr sz="1800">
                 <a:solidFill>
                   <a:srgbClr val="000000"/>
@@ -9675,7 +9901,7 @@
             </a:endParaRPr>
           </a:p>
           <a:p>
-            <a:pPr lvl="0" marL="676654" indent="-640078">
+            <a:pPr lvl="0" marL="1103372" indent="-1066796">
               <a:defRPr sz="1800">
                 <a:solidFill>
                   <a:srgbClr val="000000"/>
@@ -9697,7 +9923,7 @@
             </a:endParaRPr>
           </a:p>
           <a:p>
-            <a:pPr lvl="0" marL="676654" indent="-640078">
+            <a:pPr lvl="0" marL="1103372" indent="-1066796">
               <a:defRPr sz="1800">
                 <a:solidFill>
                   <a:srgbClr val="000000"/>
@@ -9719,7 +9945,7 @@
             </a:endParaRPr>
           </a:p>
           <a:p>
-            <a:pPr lvl="0" marL="676654" indent="-640078">
+            <a:pPr lvl="0" marL="1103372" indent="-1066796">
               <a:defRPr sz="1800">
                 <a:solidFill>
                   <a:srgbClr val="000000"/>
@@ -9789,14 +10015,14 @@
     </a:clrScheme>
     <a:fontScheme name="Default">
       <a:majorFont>
+        <a:latin typeface="Helvetica Neue"/>
+        <a:ea typeface="Helvetica Neue"/>
+        <a:cs typeface="Helvetica Neue"/>
+      </a:majorFont>
+      <a:minorFont>
         <a:latin typeface="Helvetica"/>
         <a:ea typeface="Helvetica"/>
         <a:cs typeface="Helvetica"/>
-      </a:majorFont>
-      <a:minorFont>
-        <a:latin typeface="Helvetica Neue"/>
-        <a:ea typeface="Helvetica Neue"/>
-        <a:cs typeface="Helvetica Neue"/>
       </a:minorFont>
     </a:fontScheme>
     <a:fmtScheme name="Default">
@@ -9979,7 +10205,7 @@
             <a:latin typeface="+mj-lt"/>
             <a:ea typeface="+mj-ea"/>
             <a:cs typeface="+mj-cs"/>
-            <a:sym typeface="Helvetica"/>
+            <a:sym typeface="Helvetica Neue"/>
           </a:defRPr>
         </a:defPPr>
         <a:lvl1pPr marL="0" marR="0" indent="0" algn="l" defTabSz="914400" rtl="0" fontAlgn="auto" latinLnBrk="1" hangingPunct="0">
@@ -10548,7 +10774,7 @@
             <a:latin typeface="+mj-lt"/>
             <a:ea typeface="+mj-ea"/>
             <a:cs typeface="+mj-cs"/>
-            <a:sym typeface="Helvetica"/>
+            <a:sym typeface="Helvetica Neue"/>
           </a:defRPr>
         </a:defPPr>
         <a:lvl1pPr marL="0" marR="0" indent="0" algn="l" defTabSz="914400" rtl="0" fontAlgn="auto" latinLnBrk="1" hangingPunct="0">
@@ -10840,14 +11066,14 @@
     </a:clrScheme>
     <a:fontScheme name="Default">
       <a:majorFont>
+        <a:latin typeface="Helvetica Neue"/>
+        <a:ea typeface="Helvetica Neue"/>
+        <a:cs typeface="Helvetica Neue"/>
+      </a:majorFont>
+      <a:minorFont>
         <a:latin typeface="Helvetica"/>
         <a:ea typeface="Helvetica"/>
         <a:cs typeface="Helvetica"/>
-      </a:majorFont>
-      <a:minorFont>
-        <a:latin typeface="Helvetica Neue"/>
-        <a:ea typeface="Helvetica Neue"/>
-        <a:cs typeface="Helvetica Neue"/>
       </a:minorFont>
     </a:fontScheme>
     <a:fmtScheme name="Default">
@@ -11030,7 +11256,7 @@
             <a:latin typeface="+mj-lt"/>
             <a:ea typeface="+mj-ea"/>
             <a:cs typeface="+mj-cs"/>
-            <a:sym typeface="Helvetica"/>
+            <a:sym typeface="Helvetica Neue"/>
           </a:defRPr>
         </a:defPPr>
         <a:lvl1pPr marL="0" marR="0" indent="0" algn="l" defTabSz="914400" rtl="0" fontAlgn="auto" latinLnBrk="1" hangingPunct="0">
@@ -11599,7 +11825,7 @@
             <a:latin typeface="+mj-lt"/>
             <a:ea typeface="+mj-ea"/>
             <a:cs typeface="+mj-cs"/>
-            <a:sym typeface="Helvetica"/>
+            <a:sym typeface="Helvetica Neue"/>
           </a:defRPr>
         </a:defPPr>
         <a:lvl1pPr marL="0" marR="0" indent="0" algn="l" defTabSz="914400" rtl="0" fontAlgn="auto" latinLnBrk="1" hangingPunct="0">

</xml_diff>